<commit_message>
Added some C code walkthrough in presentation
</commit_message>
<xml_diff>
--- a/ECG Heart Monitor.pptx
+++ b/ECG Heart Monitor.pptx
@@ -12,15 +12,18 @@
     <p:sldId id="262" r:id="rId6"/>
     <p:sldId id="257" r:id="rId7"/>
     <p:sldId id="260" r:id="rId8"/>
-    <p:sldId id="263" r:id="rId9"/>
-    <p:sldId id="264" r:id="rId10"/>
-    <p:sldId id="265" r:id="rId11"/>
-    <p:sldId id="266" r:id="rId12"/>
-    <p:sldId id="267" r:id="rId13"/>
-    <p:sldId id="269" r:id="rId14"/>
-    <p:sldId id="268" r:id="rId15"/>
-    <p:sldId id="270" r:id="rId16"/>
-    <p:sldId id="271" r:id="rId17"/>
+    <p:sldId id="273" r:id="rId9"/>
+    <p:sldId id="263" r:id="rId10"/>
+    <p:sldId id="264" r:id="rId11"/>
+    <p:sldId id="272" r:id="rId12"/>
+    <p:sldId id="265" r:id="rId13"/>
+    <p:sldId id="266" r:id="rId14"/>
+    <p:sldId id="274" r:id="rId15"/>
+    <p:sldId id="267" r:id="rId16"/>
+    <p:sldId id="269" r:id="rId17"/>
+    <p:sldId id="268" r:id="rId18"/>
+    <p:sldId id="270" r:id="rId19"/>
+    <p:sldId id="271" r:id="rId20"/>
   </p:sldIdLst>
   <p:sldSz cx="12192000" cy="6858000"/>
   <p:notesSz cx="6858000" cy="9144000"/>
@@ -3687,7 +3690,15 @@
           <a:p>
             <a:r>
               <a:rPr lang="en-US" dirty="0" smtClean="0"/>
-              <a:t>Calculating heart rate</a:t>
+              <a:t>Reporting 60 seconds of data (</a:t>
+            </a:r>
+            <a:r>
+              <a:rPr lang="en-US" dirty="0" err="1" smtClean="0"/>
+              <a:t>Mcu</a:t>
+            </a:r>
+            <a:r>
+              <a:rPr lang="en-US" dirty="0" smtClean="0"/>
+              <a:t> side)</a:t>
             </a:r>
             <a:endParaRPr lang="en-US" dirty="0"/>
           </a:p>
@@ -3710,53 +3721,41 @@
           <a:p>
             <a:r>
               <a:rPr lang="en-US" dirty="0" smtClean="0"/>
-              <a:t>Serial command “a”</a:t>
-            </a:r>
-          </a:p>
-          <a:p>
-            <a:r>
-              <a:rPr lang="en-US" dirty="0" smtClean="0"/>
-              <a:t>Enables Timer 3 which has an overflow period of 10 </a:t>
-            </a:r>
-            <a:r>
-              <a:rPr lang="en-US" dirty="0" err="1" smtClean="0"/>
-              <a:t>ms</a:t>
-            </a:r>
-            <a:r>
-              <a:rPr lang="en-US" dirty="0" smtClean="0"/>
-              <a:t> to collect ADC data for 3 seconds</a:t>
+              <a:t>Serial command:  “b”</a:t>
+            </a:r>
+          </a:p>
+          <a:p>
+            <a:r>
+              <a:rPr lang="en-US" dirty="0" smtClean="0"/>
+              <a:t>The command enables Timer 1 and Timer 2</a:t>
             </a:r>
           </a:p>
           <a:p>
             <a:pPr lvl="1"/>
             <a:r>
               <a:rPr lang="en-US" dirty="0" smtClean="0"/>
-              <a:t>Timer 3 has a pre-scaler value of 800 and a counter period of 100</a:t>
+              <a:t>Timer 1 enables ADC conversion at the specified sampling rate, reporting the output over UART</a:t>
             </a:r>
           </a:p>
           <a:p>
             <a:pPr lvl="1"/>
             <a:r>
               <a:rPr lang="en-US" dirty="0" smtClean="0"/>
-              <a:t>Period = 800 * 100 / 8000000 = 0.01 s = 10 </a:t>
-            </a:r>
-            <a:r>
-              <a:rPr lang="en-US" dirty="0" err="1" smtClean="0"/>
-              <a:t>ms</a:t>
-            </a:r>
-            <a:endParaRPr lang="en-US" dirty="0" smtClean="0"/>
-          </a:p>
-          <a:p>
-            <a:pPr lvl="1"/>
-            <a:r>
-              <a:rPr lang="en-US" dirty="0" smtClean="0"/>
-              <a:t>300 data points are collected</a:t>
-            </a:r>
-          </a:p>
-          <a:p>
-            <a:r>
-              <a:rPr lang="en-US" dirty="0" smtClean="0"/>
-              <a:t>Collected data points are analyzed to determine the heart rate</a:t>
+              <a:t>Timer 2 has an overflow period of 60 seconds and disables Timer 1 (and itself) on first overflow</a:t>
+            </a:r>
+          </a:p>
+          <a:p>
+            <a:pPr lvl="2"/>
+            <a:r>
+              <a:rPr lang="en-US" dirty="0" smtClean="0"/>
+              <a:t>Timer 2 has a pre-scaler value of 16000 and counter period of 30000 and clock frequency of 8 MHz</a:t>
+            </a:r>
+          </a:p>
+          <a:p>
+            <a:pPr lvl="3"/>
+            <a:r>
+              <a:rPr lang="en-US" dirty="0" smtClean="0"/>
+              <a:t>Timer 2 period = 16000 * 30000 / 8000000 = 60 seconds</a:t>
             </a:r>
             <a:endParaRPr lang="en-US" dirty="0"/>
           </a:p>
@@ -3765,7 +3764,7 @@
     </p:spTree>
     <p:extLst>
       <p:ext uri="{BB962C8B-B14F-4D97-AF65-F5344CB8AC3E}">
-        <p14:creationId xmlns:p14="http://schemas.microsoft.com/office/powerpoint/2010/main" val="1761038134"/>
+        <p14:creationId xmlns:p14="http://schemas.microsoft.com/office/powerpoint/2010/main" val="1999252500"/>
       </p:ext>
     </p:extLst>
   </p:cSld>
@@ -3809,88 +3808,21 @@
           <a:p>
             <a:r>
               <a:rPr lang="en-US" dirty="0" smtClean="0"/>
-              <a:t>Heart rate algorithm (tentative)</a:t>
-            </a:r>
-            <a:endParaRPr lang="en-US" dirty="0"/>
-          </a:p>
-        </p:txBody>
-      </p:sp>
-      <p:sp>
-        <p:nvSpPr>
-          <p:cNvPr id="3" name="Content Placeholder 2"/>
-          <p:cNvSpPr>
-            <a:spLocks noGrp="1"/>
-          </p:cNvSpPr>
-          <p:nvPr>
-            <p:ph idx="1"/>
-          </p:nvPr>
-        </p:nvSpPr>
-        <p:spPr>
-          <a:xfrm>
-            <a:off x="715108" y="2015732"/>
-            <a:ext cx="7624396" cy="4080268"/>
-          </a:xfrm>
-        </p:spPr>
-        <p:txBody>
-          <a:bodyPr>
-            <a:normAutofit/>
-          </a:bodyPr>
-          <a:lstStyle/>
-          <a:p>
-            <a:r>
-              <a:rPr lang="en-US" dirty="0" smtClean="0"/>
-              <a:t>The first peak is identified in the 3 seconds window</a:t>
-            </a:r>
-          </a:p>
-          <a:p>
-            <a:pPr lvl="1"/>
-            <a:r>
-              <a:rPr lang="en-US" dirty="0" smtClean="0"/>
-              <a:t>A peak is defined as a data point with a larger value than the 10 surrounding point</a:t>
-            </a:r>
-          </a:p>
-          <a:p>
-            <a:r>
-              <a:rPr lang="en-US" dirty="0" smtClean="0"/>
-              <a:t>The next peak is identified, with peaks within 300 milliseconds of the first peak ignored</a:t>
-            </a:r>
-          </a:p>
-          <a:p>
-            <a:pPr lvl="1"/>
-            <a:r>
-              <a:rPr lang="en-US" dirty="0" smtClean="0"/>
-              <a:t>Peaks are not necessarily QRS complex; they could be P or T waves</a:t>
-            </a:r>
-          </a:p>
-          <a:p>
-            <a:pPr lvl="1"/>
-            <a:r>
-              <a:rPr lang="en-US" dirty="0" smtClean="0"/>
-              <a:t>This is to ignore P or T waves posing as QRS complex</a:t>
-            </a:r>
-          </a:p>
-          <a:p>
-            <a:r>
-              <a:rPr lang="en-US" dirty="0" smtClean="0"/>
-              <a:t>The period of the heart rate is the time difference of the two peaks</a:t>
-            </a:r>
-          </a:p>
-          <a:p>
-            <a:pPr lvl="1"/>
-            <a:r>
-              <a:rPr lang="en-US" dirty="0" smtClean="0"/>
-              <a:t>Heart rate in BPM = 60 / period (in seconds)</a:t>
-            </a:r>
+              <a:t>Timer interrupt callbacks</a:t>
+            </a:r>
+            <a:endParaRPr lang="en-US" dirty="0"/>
           </a:p>
         </p:txBody>
       </p:sp>
       <p:pic>
         <p:nvPicPr>
-          <p:cNvPr id="4" name="Picture 3"/>
+          <p:cNvPr id="4" name="Content Placeholder 3"/>
           <p:cNvPicPr>
-            <a:picLocks noChangeAspect="1"/>
+            <a:picLocks noGrp="1" noChangeAspect="1"/>
           </p:cNvPicPr>
-          <p:nvPr/>
+          <p:nvPr>
+            <p:ph idx="1"/>
+          </p:nvPr>
         </p:nvPicPr>
         <p:blipFill>
           <a:blip r:embed="rId2"/>
@@ -3900,8 +3832,8 @@
         </p:blipFill>
         <p:spPr>
           <a:xfrm>
-            <a:off x="8339504" y="2645663"/>
-            <a:ext cx="3695700" cy="2190750"/>
+            <a:off x="2450225" y="2203269"/>
+            <a:ext cx="7605982" cy="2722721"/>
           </a:xfrm>
           <a:prstGeom prst="rect">
             <a:avLst/>
@@ -3911,7 +3843,7 @@
     </p:spTree>
     <p:extLst>
       <p:ext uri="{BB962C8B-B14F-4D97-AF65-F5344CB8AC3E}">
-        <p14:creationId xmlns:p14="http://schemas.microsoft.com/office/powerpoint/2010/main" val="1499841881"/>
+        <p14:creationId xmlns:p14="http://schemas.microsoft.com/office/powerpoint/2010/main" val="4151907949"/>
       </p:ext>
     </p:extLst>
   </p:cSld>
@@ -3955,7 +3887,7 @@
           <a:p>
             <a:r>
               <a:rPr lang="en-US" dirty="0" smtClean="0"/>
-              <a:t>PC Side</a:t>
+              <a:t>Calculating heart rate</a:t>
             </a:r>
             <a:endParaRPr lang="en-US" dirty="0"/>
           </a:p>
@@ -3971,91 +3903,69 @@
             <p:ph idx="1"/>
           </p:nvPr>
         </p:nvSpPr>
-        <p:spPr>
-          <a:xfrm>
-            <a:off x="1451580" y="2015733"/>
-            <a:ext cx="10107374" cy="2028730"/>
-          </a:xfrm>
-        </p:spPr>
-        <p:txBody>
-          <a:bodyPr>
-            <a:normAutofit fontScale="92500" lnSpcReduction="10000"/>
-          </a:bodyPr>
-          <a:lstStyle/>
-          <a:p>
-            <a:r>
-              <a:rPr lang="en-US" dirty="0" smtClean="0"/>
-              <a:t>PC application running on top of Python and </a:t>
+        <p:spPr/>
+        <p:txBody>
+          <a:bodyPr/>
+          <a:lstStyle/>
+          <a:p>
+            <a:r>
+              <a:rPr lang="en-US" dirty="0" smtClean="0"/>
+              <a:t>Serial command “a”</a:t>
+            </a:r>
+          </a:p>
+          <a:p>
+            <a:r>
+              <a:rPr lang="en-US" dirty="0" smtClean="0"/>
+              <a:t>Enables Timer 3 which has an overflow period of 10 </a:t>
             </a:r>
             <a:r>
               <a:rPr lang="en-US" dirty="0" err="1" smtClean="0"/>
-              <a:t>Tkinter</a:t>
-            </a:r>
-            <a:r>
-              <a:rPr lang="en-US" dirty="0" smtClean="0"/>
-              <a:t> for GUI</a:t>
-            </a:r>
-          </a:p>
-          <a:p>
-            <a:r>
-              <a:rPr lang="en-US" dirty="0" smtClean="0"/>
-              <a:t>Connected to the microcontroller via serial connection</a:t>
+              <a:t>ms</a:t>
+            </a:r>
+            <a:r>
+              <a:rPr lang="en-US" dirty="0" smtClean="0"/>
+              <a:t> to collect ADC data for 3 seconds</a:t>
             </a:r>
           </a:p>
           <a:p>
             <a:pPr lvl="1"/>
             <a:r>
+              <a:rPr lang="en-US" dirty="0" smtClean="0"/>
+              <a:t>Timer 3 has a pre-scaler value of 800 and a counter period of 100</a:t>
+            </a:r>
+          </a:p>
+          <a:p>
+            <a:pPr lvl="1"/>
+            <a:r>
+              <a:rPr lang="en-US" dirty="0" smtClean="0"/>
+              <a:t>Period = 800 * 100 / 8000000 = 0.01 s = 10 </a:t>
+            </a:r>
+            <a:r>
               <a:rPr lang="en-US" dirty="0" err="1" smtClean="0"/>
-              <a:t>pySerial</a:t>
-            </a:r>
-            <a:r>
-              <a:rPr lang="en-US" dirty="0" smtClean="0"/>
-              <a:t> on the PC side</a:t>
-            </a:r>
+              <a:t>ms</a:t>
+            </a:r>
+            <a:endParaRPr lang="en-US" dirty="0" smtClean="0"/>
           </a:p>
           <a:p>
             <a:pPr lvl="1"/>
             <a:r>
               <a:rPr lang="en-US" dirty="0" smtClean="0"/>
-              <a:t>UART module on the MCU side</a:t>
-            </a:r>
-          </a:p>
-          <a:p>
-            <a:r>
-              <a:rPr lang="en-US" dirty="0" smtClean="0"/>
-              <a:t>GUI allows user to select the COM port and the baud rate to connect with the microcontroller</a:t>
-            </a:r>
-          </a:p>
-        </p:txBody>
-      </p:sp>
-      <p:pic>
-        <p:nvPicPr>
-          <p:cNvPr id="5" name="Picture 4"/>
-          <p:cNvPicPr>
-            <a:picLocks noChangeAspect="1"/>
-          </p:cNvPicPr>
-          <p:nvPr/>
-        </p:nvPicPr>
-        <p:blipFill>
-          <a:blip r:embed="rId2"/>
-          <a:stretch>
-            <a:fillRect/>
-          </a:stretch>
-        </p:blipFill>
-        <p:spPr>
-          <a:xfrm>
-            <a:off x="3262366" y="4218167"/>
-            <a:ext cx="5981700" cy="1552575"/>
-          </a:xfrm>
-          <a:prstGeom prst="rect">
-            <a:avLst/>
-          </a:prstGeom>
-        </p:spPr>
-      </p:pic>
+              <a:t>300 data points are collected</a:t>
+            </a:r>
+          </a:p>
+          <a:p>
+            <a:r>
+              <a:rPr lang="en-US" dirty="0" smtClean="0"/>
+              <a:t>Collected data points are analyzed to determine the heart rate</a:t>
+            </a:r>
+            <a:endParaRPr lang="en-US" dirty="0"/>
+          </a:p>
+        </p:txBody>
+      </p:sp>
     </p:spTree>
     <p:extLst>
       <p:ext uri="{BB962C8B-B14F-4D97-AF65-F5344CB8AC3E}">
-        <p14:creationId xmlns:p14="http://schemas.microsoft.com/office/powerpoint/2010/main" val="136189752"/>
+        <p14:creationId xmlns:p14="http://schemas.microsoft.com/office/powerpoint/2010/main" val="1761038134"/>
       </p:ext>
     </p:extLst>
   </p:cSld>
@@ -4099,15 +4009,15 @@
           <a:p>
             <a:r>
               <a:rPr lang="en-US" dirty="0" smtClean="0"/>
-              <a:t>COMMANDS GUI</a:t>
-            </a:r>
-            <a:endParaRPr lang="en-US" dirty="0"/>
-          </a:p>
-        </p:txBody>
-      </p:sp>
-      <p:sp>
-        <p:nvSpPr>
-          <p:cNvPr id="5" name="Content Placeholder 4"/>
+              <a:t>Heart rate algorithm (tentative)</a:t>
+            </a:r>
+            <a:endParaRPr lang="en-US" dirty="0"/>
+          </a:p>
+        </p:txBody>
+      </p:sp>
+      <p:sp>
+        <p:nvSpPr>
+          <p:cNvPr id="3" name="Content Placeholder 2"/>
           <p:cNvSpPr>
             <a:spLocks noGrp="1"/>
           </p:cNvSpPr>
@@ -4117,55 +4027,66 @@
         </p:nvSpPr>
         <p:spPr>
           <a:xfrm>
-            <a:off x="1451580" y="2015732"/>
-            <a:ext cx="4761652" cy="3450613"/>
-          </a:xfrm>
-        </p:spPr>
-        <p:txBody>
-          <a:bodyPr/>
-          <a:lstStyle/>
-          <a:p>
-            <a:r>
-              <a:rPr lang="en-US" dirty="0" smtClean="0"/>
-              <a:t>Three commands are available to users</a:t>
-            </a:r>
-          </a:p>
-          <a:p>
-            <a:pPr marL="800100" lvl="1" indent="-342900">
-              <a:buFont typeface="+mj-lt"/>
-              <a:buAutoNum type="arabicPeriod"/>
-            </a:pPr>
-            <a:r>
-              <a:rPr lang="en-US" dirty="0" smtClean="0"/>
-              <a:t>Setting sampling rate. Must enter a valid positive integer</a:t>
-            </a:r>
-          </a:p>
-          <a:p>
-            <a:pPr marL="800100" lvl="1" indent="-342900">
-              <a:buFont typeface="+mj-lt"/>
-              <a:buAutoNum type="arabicPeriod"/>
-            </a:pPr>
-            <a:r>
-              <a:rPr lang="en-US" dirty="0" smtClean="0"/>
-              <a:t>Displaying one minute worth of data (check next slide for details)</a:t>
-            </a:r>
-          </a:p>
-          <a:p>
-            <a:pPr marL="800100" lvl="1" indent="-342900">
-              <a:buFont typeface="+mj-lt"/>
-              <a:buAutoNum type="arabicPeriod"/>
-            </a:pPr>
-            <a:r>
-              <a:rPr lang="en-US" dirty="0" smtClean="0"/>
-              <a:t>Calculating the heart rate in BPM (jump two slides forward)</a:t>
-            </a:r>
-            <a:endParaRPr lang="en-US" dirty="0"/>
+            <a:off x="715108" y="2015732"/>
+            <a:ext cx="7624396" cy="4080268"/>
+          </a:xfrm>
+        </p:spPr>
+        <p:txBody>
+          <a:bodyPr>
+            <a:normAutofit/>
+          </a:bodyPr>
+          <a:lstStyle/>
+          <a:p>
+            <a:r>
+              <a:rPr lang="en-US" dirty="0" smtClean="0"/>
+              <a:t>The first peak is identified in the 3 seconds window</a:t>
+            </a:r>
+          </a:p>
+          <a:p>
+            <a:pPr lvl="1"/>
+            <a:r>
+              <a:rPr lang="en-US" dirty="0" smtClean="0"/>
+              <a:t>A peak is defined as a data point with a larger value than the 10 surrounding point</a:t>
+            </a:r>
+          </a:p>
+          <a:p>
+            <a:r>
+              <a:rPr lang="en-US" dirty="0" smtClean="0"/>
+              <a:t>The next peak is identified, with peaks within 300 milliseconds of the first peak ignored</a:t>
+            </a:r>
+          </a:p>
+          <a:p>
+            <a:pPr lvl="1"/>
+            <a:r>
+              <a:rPr lang="en-US" dirty="0" smtClean="0"/>
+              <a:t>Peaks are not necessarily QRS complex; they could be P or T waves</a:t>
+            </a:r>
+          </a:p>
+          <a:p>
+            <a:pPr lvl="1"/>
+            <a:r>
+              <a:rPr lang="en-US" dirty="0" smtClean="0"/>
+              <a:t>This is to ignore P or T waves posing as QRS complex</a:t>
+            </a:r>
+          </a:p>
+          <a:p>
+            <a:r>
+              <a:rPr lang="en-US" dirty="0" smtClean="0"/>
+              <a:t>The period of the heart rate is the time difference of the two peaks</a:t>
+            </a:r>
+          </a:p>
+          <a:p>
+            <a:pPr lvl="1"/>
+            <a:r>
+              <a:rPr lang="en-US" dirty="0" smtClean="0"/>
+              <a:t>Heart rate in BPM = 60 / period (in seconds)</a:t>
+            </a:r>
           </a:p>
         </p:txBody>
       </p:sp>
       <p:pic>
         <p:nvPicPr>
-          <p:cNvPr id="6" name="Picture 5"/>
+          <p:cNvPr id="4" name="Picture 3"/>
           <p:cNvPicPr>
             <a:picLocks noChangeAspect="1"/>
           </p:cNvPicPr>
@@ -4179,8 +4100,8 @@
         </p:blipFill>
         <p:spPr>
           <a:xfrm>
-            <a:off x="7211615" y="2219954"/>
-            <a:ext cx="4310246" cy="3042168"/>
+            <a:off x="8339504" y="2645663"/>
+            <a:ext cx="3695700" cy="2190750"/>
           </a:xfrm>
           <a:prstGeom prst="rect">
             <a:avLst/>
@@ -4190,7 +4111,7 @@
     </p:spTree>
     <p:extLst>
       <p:ext uri="{BB962C8B-B14F-4D97-AF65-F5344CB8AC3E}">
-        <p14:creationId xmlns:p14="http://schemas.microsoft.com/office/powerpoint/2010/main" val="811174978"/>
+        <p14:creationId xmlns:p14="http://schemas.microsoft.com/office/powerpoint/2010/main" val="1499841881"/>
       </p:ext>
     </p:extLst>
   </p:cSld>
@@ -4234,47 +4155,15 @@
           <a:p>
             <a:r>
               <a:rPr lang="en-US" dirty="0" smtClean="0"/>
-              <a:t>Displaying ECG Data in real time</a:t>
-            </a:r>
-            <a:endParaRPr lang="en-US" dirty="0"/>
-          </a:p>
-        </p:txBody>
-      </p:sp>
-      <p:sp>
-        <p:nvSpPr>
-          <p:cNvPr id="3" name="Content Placeholder 2"/>
-          <p:cNvSpPr>
-            <a:spLocks noGrp="1"/>
-          </p:cNvSpPr>
-          <p:nvPr>
-            <p:ph idx="1"/>
-          </p:nvPr>
-        </p:nvSpPr>
-        <p:spPr>
-          <a:xfrm>
-            <a:off x="1451580" y="2015732"/>
-            <a:ext cx="5523652" cy="3450613"/>
-          </a:xfrm>
-        </p:spPr>
-        <p:txBody>
-          <a:bodyPr/>
-          <a:lstStyle/>
-          <a:p>
-            <a:r>
-              <a:rPr lang="en-US" dirty="0" smtClean="0"/>
-              <a:t>Choosing to display continuous ECG data, the app issues a serial command to the MCU (“b”)</a:t>
-            </a:r>
-          </a:p>
-          <a:p>
-            <a:r>
-              <a:rPr lang="en-US" dirty="0" smtClean="0"/>
-              <a:t>The MCU returns continuous readings for 60 seconds at the specified sampling rate </a:t>
-            </a:r>
-          </a:p>
-          <a:p>
-            <a:r>
-              <a:rPr lang="en-US" dirty="0" smtClean="0"/>
-              <a:t>The app displays a screen that is updated in real time of the ECG data</a:t>
+              <a:t>Heart </a:t>
+            </a:r>
+            <a:r>
+              <a:rPr lang="en-US" smtClean="0"/>
+              <a:t>rate Algorithm </a:t>
+            </a:r>
+            <a:r>
+              <a:rPr lang="en-US" dirty="0" smtClean="0"/>
+              <a:t>implementation</a:t>
             </a:r>
             <a:endParaRPr lang="en-US" dirty="0"/>
           </a:p>
@@ -4282,11 +4171,13 @@
       </p:sp>
       <p:pic>
         <p:nvPicPr>
-          <p:cNvPr id="4" name="Picture 3"/>
+          <p:cNvPr id="4" name="Content Placeholder 3"/>
           <p:cNvPicPr>
-            <a:picLocks noChangeAspect="1"/>
+            <a:picLocks noGrp="1" noChangeAspect="1"/>
           </p:cNvPicPr>
-          <p:nvPr/>
+          <p:nvPr>
+            <p:ph idx="1"/>
+          </p:nvPr>
         </p:nvPicPr>
         <p:blipFill>
           <a:blip r:embed="rId2"/>
@@ -4296,8 +4187,32 @@
         </p:blipFill>
         <p:spPr>
           <a:xfrm>
-            <a:off x="7069016" y="2073997"/>
-            <a:ext cx="3761642" cy="3392348"/>
+            <a:off x="223892" y="2089989"/>
+            <a:ext cx="5001252" cy="2709999"/>
+          </a:xfrm>
+          <a:prstGeom prst="rect">
+            <a:avLst/>
+          </a:prstGeom>
+        </p:spPr>
+      </p:pic>
+      <p:pic>
+        <p:nvPicPr>
+          <p:cNvPr id="5" name="Picture 4"/>
+          <p:cNvPicPr>
+            <a:picLocks noChangeAspect="1"/>
+          </p:cNvPicPr>
+          <p:nvPr/>
+        </p:nvPicPr>
+        <p:blipFill>
+          <a:blip r:embed="rId3"/>
+          <a:stretch>
+            <a:fillRect/>
+          </a:stretch>
+        </p:blipFill>
+        <p:spPr>
+          <a:xfrm>
+            <a:off x="5712823" y="2089989"/>
+            <a:ext cx="5547360" cy="4079396"/>
           </a:xfrm>
           <a:prstGeom prst="rect">
             <a:avLst/>
@@ -4307,7 +4222,7 @@
     </p:spTree>
     <p:extLst>
       <p:ext uri="{BB962C8B-B14F-4D97-AF65-F5344CB8AC3E}">
-        <p14:creationId xmlns:p14="http://schemas.microsoft.com/office/powerpoint/2010/main" val="3040397417"/>
+        <p14:creationId xmlns:p14="http://schemas.microsoft.com/office/powerpoint/2010/main" val="1610309281"/>
       </p:ext>
     </p:extLst>
   </p:cSld>
@@ -4351,7 +4266,7 @@
           <a:p>
             <a:r>
               <a:rPr lang="en-US" dirty="0" smtClean="0"/>
-              <a:t>Calculating heart rate</a:t>
+              <a:t>PC Side</a:t>
             </a:r>
             <a:endParaRPr lang="en-US" dirty="0"/>
           </a:p>
@@ -4369,29 +4284,308 @@
         </p:nvSpPr>
         <p:spPr>
           <a:xfrm>
+            <a:off x="1451580" y="2015733"/>
+            <a:ext cx="10107374" cy="2028730"/>
+          </a:xfrm>
+        </p:spPr>
+        <p:txBody>
+          <a:bodyPr>
+            <a:normAutofit fontScale="92500" lnSpcReduction="10000"/>
+          </a:bodyPr>
+          <a:lstStyle/>
+          <a:p>
+            <a:r>
+              <a:rPr lang="en-US" dirty="0" smtClean="0"/>
+              <a:t>PC application running on top of Python and </a:t>
+            </a:r>
+            <a:r>
+              <a:rPr lang="en-US" dirty="0" err="1" smtClean="0"/>
+              <a:t>Tkinter</a:t>
+            </a:r>
+            <a:r>
+              <a:rPr lang="en-US" dirty="0" smtClean="0"/>
+              <a:t> for GUI</a:t>
+            </a:r>
+          </a:p>
+          <a:p>
+            <a:r>
+              <a:rPr lang="en-US" dirty="0" smtClean="0"/>
+              <a:t>Connected to the microcontroller via serial connection</a:t>
+            </a:r>
+          </a:p>
+          <a:p>
+            <a:pPr lvl="1"/>
+            <a:r>
+              <a:rPr lang="en-US" dirty="0" err="1" smtClean="0"/>
+              <a:t>pySerial</a:t>
+            </a:r>
+            <a:r>
+              <a:rPr lang="en-US" dirty="0" smtClean="0"/>
+              <a:t> on the PC side</a:t>
+            </a:r>
+          </a:p>
+          <a:p>
+            <a:pPr lvl="1"/>
+            <a:r>
+              <a:rPr lang="en-US" dirty="0" smtClean="0"/>
+              <a:t>UART module on the MCU side</a:t>
+            </a:r>
+          </a:p>
+          <a:p>
+            <a:r>
+              <a:rPr lang="en-US" dirty="0" smtClean="0"/>
+              <a:t>GUI allows user to select the COM port and the baud rate to connect with the microcontroller</a:t>
+            </a:r>
+          </a:p>
+        </p:txBody>
+      </p:sp>
+      <p:pic>
+        <p:nvPicPr>
+          <p:cNvPr id="5" name="Picture 4"/>
+          <p:cNvPicPr>
+            <a:picLocks noChangeAspect="1"/>
+          </p:cNvPicPr>
+          <p:nvPr/>
+        </p:nvPicPr>
+        <p:blipFill>
+          <a:blip r:embed="rId2"/>
+          <a:stretch>
+            <a:fillRect/>
+          </a:stretch>
+        </p:blipFill>
+        <p:spPr>
+          <a:xfrm>
+            <a:off x="3262366" y="4218167"/>
+            <a:ext cx="5981700" cy="1552575"/>
+          </a:xfrm>
+          <a:prstGeom prst="rect">
+            <a:avLst/>
+          </a:prstGeom>
+        </p:spPr>
+      </p:pic>
+    </p:spTree>
+    <p:extLst>
+      <p:ext uri="{BB962C8B-B14F-4D97-AF65-F5344CB8AC3E}">
+        <p14:creationId xmlns:p14="http://schemas.microsoft.com/office/powerpoint/2010/main" val="136189752"/>
+      </p:ext>
+    </p:extLst>
+  </p:cSld>
+  <p:clrMapOvr>
+    <a:masterClrMapping/>
+  </p:clrMapOvr>
+</p:sld>
+</file>
+
+<file path=ppt/slides/slide16.xml><?xml version="1.0" encoding="utf-8"?>
+<p:sld xmlns:a="http://schemas.openxmlformats.org/drawingml/2006/main" xmlns:r="http://schemas.openxmlformats.org/officeDocument/2006/relationships" xmlns:p="http://schemas.openxmlformats.org/presentationml/2006/main">
+  <p:cSld>
+    <p:spTree>
+      <p:nvGrpSpPr>
+        <p:cNvPr id="1" name=""/>
+        <p:cNvGrpSpPr/>
+        <p:nvPr/>
+      </p:nvGrpSpPr>
+      <p:grpSpPr>
+        <a:xfrm>
+          <a:off x="0" y="0"/>
+          <a:ext cx="0" cy="0"/>
+          <a:chOff x="0" y="0"/>
+          <a:chExt cx="0" cy="0"/>
+        </a:xfrm>
+      </p:grpSpPr>
+      <p:sp>
+        <p:nvSpPr>
+          <p:cNvPr id="2" name="Title 1"/>
+          <p:cNvSpPr>
+            <a:spLocks noGrp="1"/>
+          </p:cNvSpPr>
+          <p:nvPr>
+            <p:ph type="title"/>
+          </p:nvPr>
+        </p:nvSpPr>
+        <p:spPr/>
+        <p:txBody>
+          <a:bodyPr/>
+          <a:lstStyle/>
+          <a:p>
+            <a:r>
+              <a:rPr lang="en-US" dirty="0" smtClean="0"/>
+              <a:t>COMMANDS GUI</a:t>
+            </a:r>
+            <a:endParaRPr lang="en-US" dirty="0"/>
+          </a:p>
+        </p:txBody>
+      </p:sp>
+      <p:sp>
+        <p:nvSpPr>
+          <p:cNvPr id="5" name="Content Placeholder 4"/>
+          <p:cNvSpPr>
+            <a:spLocks noGrp="1"/>
+          </p:cNvSpPr>
+          <p:nvPr>
+            <p:ph idx="1"/>
+          </p:nvPr>
+        </p:nvSpPr>
+        <p:spPr>
+          <a:xfrm>
             <a:off x="1451580" y="2015732"/>
-            <a:ext cx="4914052" cy="3450613"/>
-          </a:xfrm>
-        </p:spPr>
-        <p:txBody>
-          <a:bodyPr/>
-          <a:lstStyle/>
-          <a:p>
-            <a:r>
-              <a:rPr lang="en-US" dirty="0" smtClean="0"/>
-              <a:t>The PC app issues a serial command to the MCU “a”</a:t>
-            </a:r>
-          </a:p>
-          <a:p>
-            <a:r>
-              <a:rPr lang="en-US" dirty="0" smtClean="0"/>
-              <a:t>The MCU performs the algorithm outlined in slide 11</a:t>
-            </a:r>
-          </a:p>
-          <a:p>
-            <a:r>
-              <a:rPr lang="en-US" dirty="0" smtClean="0"/>
-              <a:t>The value is displayed to the user </a:t>
+            <a:ext cx="4761652" cy="3450613"/>
+          </a:xfrm>
+        </p:spPr>
+        <p:txBody>
+          <a:bodyPr/>
+          <a:lstStyle/>
+          <a:p>
+            <a:r>
+              <a:rPr lang="en-US" dirty="0" smtClean="0"/>
+              <a:t>Three commands are available to users</a:t>
+            </a:r>
+          </a:p>
+          <a:p>
+            <a:pPr marL="800100" lvl="1" indent="-342900">
+              <a:buFont typeface="+mj-lt"/>
+              <a:buAutoNum type="arabicPeriod"/>
+            </a:pPr>
+            <a:r>
+              <a:rPr lang="en-US" dirty="0" smtClean="0"/>
+              <a:t>Setting sampling rate. Must enter a valid positive integer</a:t>
+            </a:r>
+          </a:p>
+          <a:p>
+            <a:pPr marL="800100" lvl="1" indent="-342900">
+              <a:buFont typeface="+mj-lt"/>
+              <a:buAutoNum type="arabicPeriod"/>
+            </a:pPr>
+            <a:r>
+              <a:rPr lang="en-US" dirty="0" smtClean="0"/>
+              <a:t>Displaying one minute worth of data (check next slide for details)</a:t>
+            </a:r>
+          </a:p>
+          <a:p>
+            <a:pPr marL="800100" lvl="1" indent="-342900">
+              <a:buFont typeface="+mj-lt"/>
+              <a:buAutoNum type="arabicPeriod"/>
+            </a:pPr>
+            <a:r>
+              <a:rPr lang="en-US" dirty="0" smtClean="0"/>
+              <a:t>Calculating the heart rate in BPM (jump two slides forward)</a:t>
+            </a:r>
+            <a:endParaRPr lang="en-US" dirty="0"/>
+          </a:p>
+        </p:txBody>
+      </p:sp>
+      <p:pic>
+        <p:nvPicPr>
+          <p:cNvPr id="6" name="Picture 5"/>
+          <p:cNvPicPr>
+            <a:picLocks noChangeAspect="1"/>
+          </p:cNvPicPr>
+          <p:nvPr/>
+        </p:nvPicPr>
+        <p:blipFill>
+          <a:blip r:embed="rId2"/>
+          <a:stretch>
+            <a:fillRect/>
+          </a:stretch>
+        </p:blipFill>
+        <p:spPr>
+          <a:xfrm>
+            <a:off x="7211615" y="2219954"/>
+            <a:ext cx="4310246" cy="3042168"/>
+          </a:xfrm>
+          <a:prstGeom prst="rect">
+            <a:avLst/>
+          </a:prstGeom>
+        </p:spPr>
+      </p:pic>
+    </p:spTree>
+    <p:extLst>
+      <p:ext uri="{BB962C8B-B14F-4D97-AF65-F5344CB8AC3E}">
+        <p14:creationId xmlns:p14="http://schemas.microsoft.com/office/powerpoint/2010/main" val="811174978"/>
+      </p:ext>
+    </p:extLst>
+  </p:cSld>
+  <p:clrMapOvr>
+    <a:masterClrMapping/>
+  </p:clrMapOvr>
+</p:sld>
+</file>
+
+<file path=ppt/slides/slide17.xml><?xml version="1.0" encoding="utf-8"?>
+<p:sld xmlns:a="http://schemas.openxmlformats.org/drawingml/2006/main" xmlns:r="http://schemas.openxmlformats.org/officeDocument/2006/relationships" xmlns:p="http://schemas.openxmlformats.org/presentationml/2006/main">
+  <p:cSld>
+    <p:spTree>
+      <p:nvGrpSpPr>
+        <p:cNvPr id="1" name=""/>
+        <p:cNvGrpSpPr/>
+        <p:nvPr/>
+      </p:nvGrpSpPr>
+      <p:grpSpPr>
+        <a:xfrm>
+          <a:off x="0" y="0"/>
+          <a:ext cx="0" cy="0"/>
+          <a:chOff x="0" y="0"/>
+          <a:chExt cx="0" cy="0"/>
+        </a:xfrm>
+      </p:grpSpPr>
+      <p:sp>
+        <p:nvSpPr>
+          <p:cNvPr id="2" name="Title 1"/>
+          <p:cNvSpPr>
+            <a:spLocks noGrp="1"/>
+          </p:cNvSpPr>
+          <p:nvPr>
+            <p:ph type="title"/>
+          </p:nvPr>
+        </p:nvSpPr>
+        <p:spPr/>
+        <p:txBody>
+          <a:bodyPr/>
+          <a:lstStyle/>
+          <a:p>
+            <a:r>
+              <a:rPr lang="en-US" dirty="0" smtClean="0"/>
+              <a:t>Displaying ECG Data in real time</a:t>
+            </a:r>
+            <a:endParaRPr lang="en-US" dirty="0"/>
+          </a:p>
+        </p:txBody>
+      </p:sp>
+      <p:sp>
+        <p:nvSpPr>
+          <p:cNvPr id="3" name="Content Placeholder 2"/>
+          <p:cNvSpPr>
+            <a:spLocks noGrp="1"/>
+          </p:cNvSpPr>
+          <p:nvPr>
+            <p:ph idx="1"/>
+          </p:nvPr>
+        </p:nvSpPr>
+        <p:spPr>
+          <a:xfrm>
+            <a:off x="1451580" y="2015732"/>
+            <a:ext cx="5523652" cy="3450613"/>
+          </a:xfrm>
+        </p:spPr>
+        <p:txBody>
+          <a:bodyPr/>
+          <a:lstStyle/>
+          <a:p>
+            <a:r>
+              <a:rPr lang="en-US" dirty="0" smtClean="0"/>
+              <a:t>Choosing to display continuous ECG data, the app issues a serial command to the MCU (“b”)</a:t>
+            </a:r>
+          </a:p>
+          <a:p>
+            <a:r>
+              <a:rPr lang="en-US" dirty="0" smtClean="0"/>
+              <a:t>The MCU returns continuous readings for 60 seconds at the specified sampling rate </a:t>
+            </a:r>
+          </a:p>
+          <a:p>
+            <a:r>
+              <a:rPr lang="en-US" dirty="0" smtClean="0"/>
+              <a:t>The app displays a screen that is updated in real time of the ECG data</a:t>
             </a:r>
             <a:endParaRPr lang="en-US" dirty="0"/>
           </a:p>
@@ -4413,6 +4607,123 @@
         </p:blipFill>
         <p:spPr>
           <a:xfrm>
+            <a:off x="7069016" y="2073997"/>
+            <a:ext cx="3761642" cy="3392348"/>
+          </a:xfrm>
+          <a:prstGeom prst="rect">
+            <a:avLst/>
+          </a:prstGeom>
+        </p:spPr>
+      </p:pic>
+    </p:spTree>
+    <p:extLst>
+      <p:ext uri="{BB962C8B-B14F-4D97-AF65-F5344CB8AC3E}">
+        <p14:creationId xmlns:p14="http://schemas.microsoft.com/office/powerpoint/2010/main" val="3040397417"/>
+      </p:ext>
+    </p:extLst>
+  </p:cSld>
+  <p:clrMapOvr>
+    <a:masterClrMapping/>
+  </p:clrMapOvr>
+</p:sld>
+</file>
+
+<file path=ppt/slides/slide18.xml><?xml version="1.0" encoding="utf-8"?>
+<p:sld xmlns:a="http://schemas.openxmlformats.org/drawingml/2006/main" xmlns:r="http://schemas.openxmlformats.org/officeDocument/2006/relationships" xmlns:p="http://schemas.openxmlformats.org/presentationml/2006/main">
+  <p:cSld>
+    <p:spTree>
+      <p:nvGrpSpPr>
+        <p:cNvPr id="1" name=""/>
+        <p:cNvGrpSpPr/>
+        <p:nvPr/>
+      </p:nvGrpSpPr>
+      <p:grpSpPr>
+        <a:xfrm>
+          <a:off x="0" y="0"/>
+          <a:ext cx="0" cy="0"/>
+          <a:chOff x="0" y="0"/>
+          <a:chExt cx="0" cy="0"/>
+        </a:xfrm>
+      </p:grpSpPr>
+      <p:sp>
+        <p:nvSpPr>
+          <p:cNvPr id="2" name="Title 1"/>
+          <p:cNvSpPr>
+            <a:spLocks noGrp="1"/>
+          </p:cNvSpPr>
+          <p:nvPr>
+            <p:ph type="title"/>
+          </p:nvPr>
+        </p:nvSpPr>
+        <p:spPr/>
+        <p:txBody>
+          <a:bodyPr/>
+          <a:lstStyle/>
+          <a:p>
+            <a:r>
+              <a:rPr lang="en-US" dirty="0" smtClean="0"/>
+              <a:t>Calculating heart rate</a:t>
+            </a:r>
+            <a:endParaRPr lang="en-US" dirty="0"/>
+          </a:p>
+        </p:txBody>
+      </p:sp>
+      <p:sp>
+        <p:nvSpPr>
+          <p:cNvPr id="3" name="Content Placeholder 2"/>
+          <p:cNvSpPr>
+            <a:spLocks noGrp="1"/>
+          </p:cNvSpPr>
+          <p:nvPr>
+            <p:ph idx="1"/>
+          </p:nvPr>
+        </p:nvSpPr>
+        <p:spPr>
+          <a:xfrm>
+            <a:off x="1451580" y="2015732"/>
+            <a:ext cx="4914052" cy="3450613"/>
+          </a:xfrm>
+        </p:spPr>
+        <p:txBody>
+          <a:bodyPr/>
+          <a:lstStyle/>
+          <a:p>
+            <a:r>
+              <a:rPr lang="en-US" dirty="0" smtClean="0"/>
+              <a:t>The PC app issues a serial command to the MCU “a”</a:t>
+            </a:r>
+          </a:p>
+          <a:p>
+            <a:r>
+              <a:rPr lang="en-US" dirty="0" smtClean="0"/>
+              <a:t>The MCU performs the algorithm outlined in slide 11</a:t>
+            </a:r>
+          </a:p>
+          <a:p>
+            <a:r>
+              <a:rPr lang="en-US" dirty="0" smtClean="0"/>
+              <a:t>The value is displayed to the user </a:t>
+            </a:r>
+            <a:endParaRPr lang="en-US" dirty="0"/>
+          </a:p>
+        </p:txBody>
+      </p:sp>
+      <p:pic>
+        <p:nvPicPr>
+          <p:cNvPr id="4" name="Picture 3"/>
+          <p:cNvPicPr>
+            <a:picLocks noChangeAspect="1"/>
+          </p:cNvPicPr>
+          <p:nvPr/>
+        </p:nvPicPr>
+        <p:blipFill>
+          <a:blip r:embed="rId2"/>
+          <a:stretch>
+            <a:fillRect/>
+          </a:stretch>
+        </p:blipFill>
+        <p:spPr>
+          <a:xfrm>
             <a:off x="7104917" y="2015732"/>
             <a:ext cx="3633097" cy="3450613"/>
           </a:xfrm>
@@ -4434,7 +4745,7 @@
 </p:sld>
 </file>
 
-<file path=ppt/slides/slide16.xml><?xml version="1.0" encoding="utf-8"?>
+<file path=ppt/slides/slide19.xml><?xml version="1.0" encoding="utf-8"?>
 <p:sld xmlns:a="http://schemas.openxmlformats.org/drawingml/2006/main" xmlns:r="http://schemas.openxmlformats.org/officeDocument/2006/relationships" xmlns:p="http://schemas.openxmlformats.org/presentationml/2006/main">
   <p:cSld>
     <p:spTree>
@@ -4762,11 +5073,7 @@
             <a:pPr lvl="1"/>
             <a:r>
               <a:rPr lang="en-US" dirty="0" smtClean="0"/>
-              <a:t>Timer 3 to regulate readings of 100 samples/s for bpm </a:t>
-            </a:r>
-            <a:r>
-              <a:rPr lang="en-US" dirty="0" smtClean="0"/>
-              <a:t>calculation</a:t>
+              <a:t>Timer 3 to regulate readings of 100 samples/s for bpm calculation</a:t>
             </a:r>
           </a:p>
           <a:p>
@@ -4782,7 +5089,6 @@
               <a:rPr lang="en-US" dirty="0" smtClean="0"/>
               <a:t>Cleaning and amplifying bio-signals for further analysis and displaying</a:t>
             </a:r>
-            <a:endParaRPr lang="en-US" dirty="0" smtClean="0"/>
           </a:p>
         </p:txBody>
       </p:sp>
@@ -4878,16 +5184,11 @@
               <a:rPr lang="en-US" dirty="0" smtClean="0"/>
               <a:t>STM32CubeMX</a:t>
             </a:r>
-            <a:endParaRPr lang="en-US" dirty="0" smtClean="0"/>
-          </a:p>
-          <a:p>
-            <a:r>
-              <a:rPr lang="en-US" dirty="0" smtClean="0"/>
-              <a:t>KEIL </a:t>
-            </a:r>
-            <a:r>
-              <a:rPr lang="en-US" dirty="0" smtClean="0"/>
-              <a:t>uVision5</a:t>
+          </a:p>
+          <a:p>
+            <a:r>
+              <a:rPr lang="en-US" dirty="0" smtClean="0"/>
+              <a:t>KEIL uVision5</a:t>
             </a:r>
             <a:endParaRPr lang="en-US" dirty="0"/>
           </a:p>
@@ -5280,87 +5581,42 @@
           <a:p>
             <a:r>
               <a:rPr lang="en-US" dirty="0" smtClean="0"/>
-              <a:t>Setting sampling rate</a:t>
-            </a:r>
-            <a:endParaRPr lang="en-US" dirty="0"/>
-          </a:p>
-        </p:txBody>
-      </p:sp>
-      <p:sp>
-        <p:nvSpPr>
-          <p:cNvPr id="3" name="Content Placeholder 2"/>
-          <p:cNvSpPr>
-            <a:spLocks noGrp="1"/>
-          </p:cNvSpPr>
+              <a:t>UART Interrupt handler (acknowledging the commands)</a:t>
+            </a:r>
+            <a:endParaRPr lang="en-US" dirty="0"/>
+          </a:p>
+        </p:txBody>
+      </p:sp>
+      <p:pic>
+        <p:nvPicPr>
+          <p:cNvPr id="4" name="Content Placeholder 3"/>
+          <p:cNvPicPr>
+            <a:picLocks noGrp="1" noChangeAspect="1"/>
+          </p:cNvPicPr>
           <p:nvPr>
             <p:ph idx="1"/>
           </p:nvPr>
-        </p:nvSpPr>
-        <p:spPr/>
-        <p:txBody>
-          <a:bodyPr/>
-          <a:lstStyle/>
-          <a:p>
-            <a:r>
-              <a:rPr lang="en-US" dirty="0" smtClean="0"/>
-              <a:t>Serial command example: “c50c”</a:t>
-            </a:r>
-          </a:p>
-          <a:p>
-            <a:r>
-              <a:rPr lang="en-US" dirty="0" smtClean="0"/>
-              <a:t>Modifies Timer 1 in the microcontroller</a:t>
-            </a:r>
-          </a:p>
-          <a:p>
-            <a:pPr lvl="1"/>
-            <a:r>
-              <a:rPr lang="en-US" dirty="0" smtClean="0"/>
-              <a:t>Timer 1 has a fixed counter period of 500 and clock frequency of 8 MHz</a:t>
-            </a:r>
-          </a:p>
-          <a:p>
-            <a:pPr lvl="1"/>
-            <a:r>
-              <a:rPr lang="en-US" dirty="0" smtClean="0"/>
-              <a:t>Timer 1 pre-scaler is modified with the sampling rate</a:t>
-            </a:r>
-          </a:p>
-          <a:p>
-            <a:pPr lvl="2"/>
-            <a:r>
-              <a:rPr lang="en-US" dirty="0" smtClean="0"/>
-              <a:t>Pre-scaler = 16000 / sampling rate</a:t>
-            </a:r>
-          </a:p>
-          <a:p>
-            <a:pPr lvl="2"/>
-            <a:r>
-              <a:rPr lang="en-US" dirty="0" smtClean="0"/>
-              <a:t>Overflow frequency = 8000000 / ( 500 * 16000 / sampling rate ) = sampling rate</a:t>
-            </a:r>
-            <a:endParaRPr lang="en-US" dirty="0"/>
-          </a:p>
-          <a:p>
-            <a:pPr lvl="1"/>
-            <a:r>
-              <a:rPr lang="en-US" dirty="0" smtClean="0"/>
-              <a:t>Overflow interrupt handler is called with the same frequency as the specified sampling rate</a:t>
-            </a:r>
-          </a:p>
-          <a:p>
-            <a:pPr lvl="2"/>
-            <a:r>
-              <a:rPr lang="en-US" dirty="0" smtClean="0"/>
-              <a:t>The handler initiates ADC conversion of the input ECG signal</a:t>
-            </a:r>
-          </a:p>
-        </p:txBody>
-      </p:sp>
+        </p:nvPicPr>
+        <p:blipFill>
+          <a:blip r:embed="rId2"/>
+          <a:stretch>
+            <a:fillRect/>
+          </a:stretch>
+        </p:blipFill>
+        <p:spPr>
+          <a:xfrm>
+            <a:off x="2904547" y="2016124"/>
+            <a:ext cx="6697338" cy="4841876"/>
+          </a:xfrm>
+          <a:prstGeom prst="rect">
+            <a:avLst/>
+          </a:prstGeom>
+        </p:spPr>
+      </p:pic>
     </p:spTree>
     <p:extLst>
       <p:ext uri="{BB962C8B-B14F-4D97-AF65-F5344CB8AC3E}">
-        <p14:creationId xmlns:p14="http://schemas.microsoft.com/office/powerpoint/2010/main" val="2443753236"/>
+        <p14:creationId xmlns:p14="http://schemas.microsoft.com/office/powerpoint/2010/main" val="716764989"/>
       </p:ext>
     </p:extLst>
   </p:cSld>
@@ -5404,15 +5660,7 @@
           <a:p>
             <a:r>
               <a:rPr lang="en-US" dirty="0" smtClean="0"/>
-              <a:t>Reporting 60 seconds of data (</a:t>
-            </a:r>
-            <a:r>
-              <a:rPr lang="en-US" dirty="0" err="1" smtClean="0"/>
-              <a:t>Mcu</a:t>
-            </a:r>
-            <a:r>
-              <a:rPr lang="en-US" dirty="0" smtClean="0"/>
-              <a:t> side)</a:t>
+              <a:t>Setting sampling rate</a:t>
             </a:r>
             <a:endParaRPr lang="en-US" dirty="0"/>
           </a:p>
@@ -5435,50 +5683,64 @@
           <a:p>
             <a:r>
               <a:rPr lang="en-US" dirty="0" smtClean="0"/>
-              <a:t>Serial command:  “b”</a:t>
-            </a:r>
-          </a:p>
-          <a:p>
-            <a:r>
-              <a:rPr lang="en-US" dirty="0" smtClean="0"/>
-              <a:t>The command enables Timer 1 and Timer 2</a:t>
+              <a:t>Serial command example: “c50c”</a:t>
+            </a:r>
+          </a:p>
+          <a:p>
+            <a:r>
+              <a:rPr lang="en-US" dirty="0" smtClean="0"/>
+              <a:t>Modifies Timer 1 in the microcontroller</a:t>
             </a:r>
           </a:p>
           <a:p>
             <a:pPr lvl="1"/>
             <a:r>
               <a:rPr lang="en-US" dirty="0" smtClean="0"/>
-              <a:t>Timer 1 enables ADC conversion at the specified sampling rate, reporting the output over UART</a:t>
+              <a:t>Timer 1 has a fixed counter period of 500 and clock frequency of 8 MHz</a:t>
             </a:r>
           </a:p>
           <a:p>
             <a:pPr lvl="1"/>
             <a:r>
               <a:rPr lang="en-US" dirty="0" smtClean="0"/>
-              <a:t>Timer 2 has an overflow period of 60 seconds and disables Timer 1 (and itself) on first overflow</a:t>
+              <a:t>Timer 1 pre-scaler is modified with the sampling rate</a:t>
             </a:r>
           </a:p>
           <a:p>
             <a:pPr lvl="2"/>
             <a:r>
               <a:rPr lang="en-US" dirty="0" smtClean="0"/>
-              <a:t>Timer 2 has a pre-scaler value of 16000 and counter period of 30000 and clock frequency of 8 MHz</a:t>
-            </a:r>
-          </a:p>
-          <a:p>
-            <a:pPr lvl="3"/>
-            <a:r>
-              <a:rPr lang="en-US" dirty="0" smtClean="0"/>
-              <a:t>Timer 2 period = 16000 * 30000 / 8000000 = 60 seconds</a:t>
-            </a:r>
-            <a:endParaRPr lang="en-US" dirty="0"/>
+              <a:t>Pre-scaler = 16000 / sampling rate</a:t>
+            </a:r>
+          </a:p>
+          <a:p>
+            <a:pPr lvl="2"/>
+            <a:r>
+              <a:rPr lang="en-US" dirty="0" smtClean="0"/>
+              <a:t>Overflow frequency = 8000000 / ( 500 * 16000 / sampling rate ) = sampling rate</a:t>
+            </a:r>
+            <a:endParaRPr lang="en-US" dirty="0"/>
+          </a:p>
+          <a:p>
+            <a:pPr lvl="1"/>
+            <a:r>
+              <a:rPr lang="en-US" dirty="0" smtClean="0"/>
+              <a:t>Overflow interrupt handler is called with the same frequency as the specified sampling rate</a:t>
+            </a:r>
+          </a:p>
+          <a:p>
+            <a:pPr lvl="2"/>
+            <a:r>
+              <a:rPr lang="en-US" dirty="0" smtClean="0"/>
+              <a:t>The handler initiates ADC conversion of the input ECG signal</a:t>
+            </a:r>
           </a:p>
         </p:txBody>
       </p:sp>
     </p:spTree>
     <p:extLst>
       <p:ext uri="{BB962C8B-B14F-4D97-AF65-F5344CB8AC3E}">
-        <p14:creationId xmlns:p14="http://schemas.microsoft.com/office/powerpoint/2010/main" val="1999252500"/>
+        <p14:creationId xmlns:p14="http://schemas.microsoft.com/office/powerpoint/2010/main" val="2443753236"/>
       </p:ext>
     </p:extLst>
   </p:cSld>

</xml_diff>

<commit_message>
Added GH url to the PPT
</commit_message>
<xml_diff>
--- a/ECG Heart Monitor.pptx
+++ b/ECG Heart Monitor.pptx
@@ -3618,9 +3618,16 @@
             <p:ph type="subTitle" idx="1"/>
           </p:nvPr>
         </p:nvSpPr>
-        <p:spPr/>
-        <p:txBody>
-          <a:bodyPr/>
+        <p:spPr>
+          <a:xfrm>
+            <a:off x="2417780" y="3531204"/>
+            <a:ext cx="8637072" cy="2085825"/>
+          </a:xfrm>
+        </p:spPr>
+        <p:txBody>
+          <a:bodyPr>
+            <a:normAutofit/>
+          </a:bodyPr>
           <a:lstStyle/>
           <a:p>
             <a:r>
@@ -3636,8 +3643,19 @@
               <a:t> </a:t>
             </a:r>
             <a:r>
-              <a:rPr lang="en-US" dirty="0" err="1" smtClean="0"/>
-              <a:t>dawoud</a:t>
+              <a:rPr lang="en-US" dirty="0" smtClean="0"/>
+              <a:t>Dawoud</a:t>
+            </a:r>
+          </a:p>
+          <a:p>
+            <a:endParaRPr lang="en-US" dirty="0"/>
+          </a:p>
+          <a:p>
+            <a:r>
+              <a:rPr lang="en-US" dirty="0">
+                <a:hlinkClick r:id="rId2"/>
+              </a:rPr>
+              <a:t>https://github.com/theRadFad/HeartMonitor</a:t>
             </a:r>
             <a:endParaRPr lang="en-US" dirty="0"/>
           </a:p>

</xml_diff>

<commit_message>
PPT Demo 2 update
</commit_message>
<xml_diff>
--- a/ECG Heart Monitor.pptx
+++ b/ECG Heart Monitor.pptx
@@ -11,19 +11,19 @@
     <p:sldId id="259" r:id="rId5"/>
     <p:sldId id="262" r:id="rId6"/>
     <p:sldId id="257" r:id="rId7"/>
-    <p:sldId id="260" r:id="rId8"/>
-    <p:sldId id="273" r:id="rId9"/>
-    <p:sldId id="263" r:id="rId10"/>
-    <p:sldId id="264" r:id="rId11"/>
-    <p:sldId id="272" r:id="rId12"/>
-    <p:sldId id="265" r:id="rId13"/>
-    <p:sldId id="266" r:id="rId14"/>
-    <p:sldId id="274" r:id="rId15"/>
-    <p:sldId id="267" r:id="rId16"/>
-    <p:sldId id="269" r:id="rId17"/>
-    <p:sldId id="268" r:id="rId18"/>
-    <p:sldId id="270" r:id="rId19"/>
-    <p:sldId id="271" r:id="rId20"/>
+    <p:sldId id="275" r:id="rId8"/>
+    <p:sldId id="260" r:id="rId9"/>
+    <p:sldId id="273" r:id="rId10"/>
+    <p:sldId id="263" r:id="rId11"/>
+    <p:sldId id="264" r:id="rId12"/>
+    <p:sldId id="272" r:id="rId13"/>
+    <p:sldId id="265" r:id="rId14"/>
+    <p:sldId id="266" r:id="rId15"/>
+    <p:sldId id="274" r:id="rId16"/>
+    <p:sldId id="267" r:id="rId17"/>
+    <p:sldId id="269" r:id="rId18"/>
+    <p:sldId id="268" r:id="rId19"/>
+    <p:sldId id="270" r:id="rId20"/>
   </p:sldIdLst>
   <p:sldSz cx="12192000" cy="6858000"/>
   <p:notesSz cx="6858000" cy="9144000"/>
@@ -269,7 +269,7 @@
           <a:p>
             <a:fld id="{48A87A34-81AB-432B-8DAE-1953F412C126}" type="datetimeFigureOut">
               <a:rPr lang="en-US" dirty="0"/>
-              <a:t>12-May-20</a:t>
+              <a:t>19-May-20</a:t>
             </a:fld>
             <a:endParaRPr lang="en-US" dirty="0"/>
           </a:p>
@@ -475,7 +475,7 @@
           <a:p>
             <a:fld id="{48A87A34-81AB-432B-8DAE-1953F412C126}" type="datetimeFigureOut">
               <a:rPr lang="en-US" dirty="0"/>
-              <a:t>12-May-20</a:t>
+              <a:t>19-May-20</a:t>
             </a:fld>
             <a:endParaRPr lang="en-US" dirty="0"/>
           </a:p>
@@ -685,7 +685,7 @@
           <a:p>
             <a:fld id="{48A87A34-81AB-432B-8DAE-1953F412C126}" type="datetimeFigureOut">
               <a:rPr lang="en-US" dirty="0"/>
-              <a:t>12-May-20</a:t>
+              <a:t>19-May-20</a:t>
             </a:fld>
             <a:endParaRPr lang="en-US" dirty="0"/>
           </a:p>
@@ -881,7 +881,7 @@
           <a:p>
             <a:fld id="{48A87A34-81AB-432B-8DAE-1953F412C126}" type="datetimeFigureOut">
               <a:rPr lang="en-US" dirty="0"/>
-              <a:t>12-May-20</a:t>
+              <a:t>19-May-20</a:t>
             </a:fld>
             <a:endParaRPr lang="en-US" dirty="0"/>
           </a:p>
@@ -1155,7 +1155,7 @@
           <a:p>
             <a:fld id="{48A87A34-81AB-432B-8DAE-1953F412C126}" type="datetimeFigureOut">
               <a:rPr lang="en-US" dirty="0"/>
-              <a:t>12-May-20</a:t>
+              <a:t>19-May-20</a:t>
             </a:fld>
             <a:endParaRPr lang="en-US" dirty="0"/>
           </a:p>
@@ -1418,7 +1418,7 @@
           <a:p>
             <a:fld id="{48A87A34-81AB-432B-8DAE-1953F412C126}" type="datetimeFigureOut">
               <a:rPr lang="en-US" dirty="0"/>
-              <a:t>12-May-20</a:t>
+              <a:t>19-May-20</a:t>
             </a:fld>
             <a:endParaRPr lang="en-US" dirty="0"/>
           </a:p>
@@ -1829,7 +1829,7 @@
           <a:p>
             <a:fld id="{48A87A34-81AB-432B-8DAE-1953F412C126}" type="datetimeFigureOut">
               <a:rPr lang="en-US" dirty="0"/>
-              <a:t>12-May-20</a:t>
+              <a:t>19-May-20</a:t>
             </a:fld>
             <a:endParaRPr lang="en-US" dirty="0"/>
           </a:p>
@@ -1973,7 +1973,7 @@
           <a:p>
             <a:fld id="{48A87A34-81AB-432B-8DAE-1953F412C126}" type="datetimeFigureOut">
               <a:rPr lang="en-US" dirty="0"/>
-              <a:t>12-May-20</a:t>
+              <a:t>19-May-20</a:t>
             </a:fld>
             <a:endParaRPr lang="en-US" dirty="0"/>
           </a:p>
@@ -2094,7 +2094,7 @@
           <a:p>
             <a:fld id="{48A87A34-81AB-432B-8DAE-1953F412C126}" type="datetimeFigureOut">
               <a:rPr lang="en-US" dirty="0"/>
-              <a:t>12-May-20</a:t>
+              <a:t>19-May-20</a:t>
             </a:fld>
             <a:endParaRPr lang="en-US" dirty="0"/>
           </a:p>
@@ -2340,7 +2340,7 @@
           <a:p>
             <a:fld id="{48A87A34-81AB-432B-8DAE-1953F412C126}" type="datetimeFigureOut">
               <a:rPr lang="en-US" dirty="0"/>
-              <a:t>12-May-20</a:t>
+              <a:t>19-May-20</a:t>
             </a:fld>
             <a:endParaRPr lang="en-US" dirty="0"/>
           </a:p>
@@ -2781,7 +2781,7 @@
             <a:fld id="{48A87A34-81AB-432B-8DAE-1953F412C126}" type="datetimeFigureOut">
               <a:rPr lang="en-US" dirty="0"/>
               <a:pPr/>
-              <a:t>12-May-20</a:t>
+              <a:t>19-May-20</a:t>
             </a:fld>
             <a:endParaRPr lang="en-US" dirty="0"/>
           </a:p>
@@ -3103,7 +3103,7 @@
             <a:fld id="{48A87A34-81AB-432B-8DAE-1953F412C126}" type="datetimeFigureOut">
               <a:rPr lang="en-US" dirty="0"/>
               <a:pPr/>
-              <a:t>12-May-20</a:t>
+              <a:t>19-May-20</a:t>
             </a:fld>
             <a:endParaRPr lang="en-US" dirty="0"/>
           </a:p>
@@ -3640,11 +3640,7 @@
             </a:r>
             <a:r>
               <a:rPr lang="en-US" dirty="0" smtClean="0"/>
-              <a:t> </a:t>
-            </a:r>
-            <a:r>
-              <a:rPr lang="en-US" dirty="0" smtClean="0"/>
-              <a:t>Dawoud</a:t>
+              <a:t> Dawoud</a:t>
             </a:r>
           </a:p>
           <a:p>
@@ -3708,15 +3704,7 @@
           <a:p>
             <a:r>
               <a:rPr lang="en-US" dirty="0" smtClean="0"/>
-              <a:t>Reporting 60 seconds of data (</a:t>
-            </a:r>
-            <a:r>
-              <a:rPr lang="en-US" dirty="0" err="1" smtClean="0"/>
-              <a:t>Mcu</a:t>
-            </a:r>
-            <a:r>
-              <a:rPr lang="en-US" dirty="0" smtClean="0"/>
-              <a:t> side)</a:t>
+              <a:t>Setting sampling rate</a:t>
             </a:r>
             <a:endParaRPr lang="en-US" dirty="0"/>
           </a:p>
@@ -3739,50 +3727,64 @@
           <a:p>
             <a:r>
               <a:rPr lang="en-US" dirty="0" smtClean="0"/>
-              <a:t>Serial command:  “b”</a:t>
-            </a:r>
-          </a:p>
-          <a:p>
-            <a:r>
-              <a:rPr lang="en-US" dirty="0" smtClean="0"/>
-              <a:t>The command enables Timer 1 and Timer 2</a:t>
+              <a:t>Serial command example: “c50c”</a:t>
+            </a:r>
+          </a:p>
+          <a:p>
+            <a:r>
+              <a:rPr lang="en-US" dirty="0" smtClean="0"/>
+              <a:t>Modifies Timer 1 in the microcontroller</a:t>
             </a:r>
           </a:p>
           <a:p>
             <a:pPr lvl="1"/>
             <a:r>
               <a:rPr lang="en-US" dirty="0" smtClean="0"/>
-              <a:t>Timer 1 enables ADC conversion at the specified sampling rate, reporting the output over UART</a:t>
+              <a:t>Timer 1 has a fixed counter period of 500 and clock frequency of 8 MHz</a:t>
             </a:r>
           </a:p>
           <a:p>
             <a:pPr lvl="1"/>
             <a:r>
               <a:rPr lang="en-US" dirty="0" smtClean="0"/>
-              <a:t>Timer 2 has an overflow period of 60 seconds and disables Timer 1 (and itself) on first overflow</a:t>
+              <a:t>Timer 1 pre-scaler is modified with the sampling rate</a:t>
             </a:r>
           </a:p>
           <a:p>
             <a:pPr lvl="2"/>
             <a:r>
               <a:rPr lang="en-US" dirty="0" smtClean="0"/>
-              <a:t>Timer 2 has a pre-scaler value of 16000 and counter period of 30000 and clock frequency of 8 MHz</a:t>
-            </a:r>
-          </a:p>
-          <a:p>
-            <a:pPr lvl="3"/>
-            <a:r>
-              <a:rPr lang="en-US" dirty="0" smtClean="0"/>
-              <a:t>Timer 2 period = 16000 * 30000 / 8000000 = 60 seconds</a:t>
-            </a:r>
-            <a:endParaRPr lang="en-US" dirty="0"/>
+              <a:t>Pre-scaler = 16000 / sampling rate</a:t>
+            </a:r>
+          </a:p>
+          <a:p>
+            <a:pPr lvl="2"/>
+            <a:r>
+              <a:rPr lang="en-US" dirty="0" smtClean="0"/>
+              <a:t>Overflow frequency = 8000000 / ( 500 * 16000 / sampling rate ) = sampling rate</a:t>
+            </a:r>
+            <a:endParaRPr lang="en-US" dirty="0"/>
+          </a:p>
+          <a:p>
+            <a:pPr lvl="1"/>
+            <a:r>
+              <a:rPr lang="en-US" dirty="0" smtClean="0"/>
+              <a:t>Overflow interrupt handler is called with the same frequency as the specified sampling rate</a:t>
+            </a:r>
+          </a:p>
+          <a:p>
+            <a:pPr lvl="2"/>
+            <a:r>
+              <a:rPr lang="en-US" dirty="0" smtClean="0"/>
+              <a:t>The handler initiates ADC conversion of the input ECG signal</a:t>
+            </a:r>
           </a:p>
         </p:txBody>
       </p:sp>
     </p:spTree>
     <p:extLst>
       <p:ext uri="{BB962C8B-B14F-4D97-AF65-F5344CB8AC3E}">
-        <p14:creationId xmlns:p14="http://schemas.microsoft.com/office/powerpoint/2010/main" val="1999252500"/>
+        <p14:creationId xmlns:p14="http://schemas.microsoft.com/office/powerpoint/2010/main" val="2443753236"/>
       </p:ext>
     </p:extLst>
   </p:cSld>
@@ -3826,42 +3828,81 @@
           <a:p>
             <a:r>
               <a:rPr lang="en-US" dirty="0" smtClean="0"/>
-              <a:t>Timer interrupt callbacks</a:t>
-            </a:r>
-            <a:endParaRPr lang="en-US" dirty="0"/>
-          </a:p>
-        </p:txBody>
-      </p:sp>
-      <p:pic>
-        <p:nvPicPr>
-          <p:cNvPr id="4" name="Content Placeholder 3"/>
-          <p:cNvPicPr>
-            <a:picLocks noGrp="1" noChangeAspect="1"/>
-          </p:cNvPicPr>
+              <a:t>Reporting 60 seconds of data (</a:t>
+            </a:r>
+            <a:r>
+              <a:rPr lang="en-US" dirty="0" err="1" smtClean="0"/>
+              <a:t>Mcu</a:t>
+            </a:r>
+            <a:r>
+              <a:rPr lang="en-US" dirty="0" smtClean="0"/>
+              <a:t> side)</a:t>
+            </a:r>
+            <a:endParaRPr lang="en-US" dirty="0"/>
+          </a:p>
+        </p:txBody>
+      </p:sp>
+      <p:sp>
+        <p:nvSpPr>
+          <p:cNvPr id="3" name="Content Placeholder 2"/>
+          <p:cNvSpPr>
+            <a:spLocks noGrp="1"/>
+          </p:cNvSpPr>
           <p:nvPr>
             <p:ph idx="1"/>
           </p:nvPr>
-        </p:nvPicPr>
-        <p:blipFill>
-          <a:blip r:embed="rId2"/>
-          <a:stretch>
-            <a:fillRect/>
-          </a:stretch>
-        </p:blipFill>
-        <p:spPr>
-          <a:xfrm>
-            <a:off x="2450225" y="2203269"/>
-            <a:ext cx="7605982" cy="2722721"/>
-          </a:xfrm>
-          <a:prstGeom prst="rect">
-            <a:avLst/>
-          </a:prstGeom>
-        </p:spPr>
-      </p:pic>
+        </p:nvSpPr>
+        <p:spPr/>
+        <p:txBody>
+          <a:bodyPr/>
+          <a:lstStyle/>
+          <a:p>
+            <a:r>
+              <a:rPr lang="en-US" dirty="0" smtClean="0"/>
+              <a:t>Serial command:  “b”</a:t>
+            </a:r>
+          </a:p>
+          <a:p>
+            <a:r>
+              <a:rPr lang="en-US" dirty="0" smtClean="0"/>
+              <a:t>The command enables Timer 1 and Timer 2</a:t>
+            </a:r>
+          </a:p>
+          <a:p>
+            <a:pPr lvl="1"/>
+            <a:r>
+              <a:rPr lang="en-US" dirty="0" smtClean="0"/>
+              <a:t>Timer 1 enables ADC conversion at the specified sampling rate, reporting the output over UART</a:t>
+            </a:r>
+          </a:p>
+          <a:p>
+            <a:pPr lvl="1"/>
+            <a:r>
+              <a:rPr lang="en-US" dirty="0" smtClean="0"/>
+              <a:t>Timer 2 has an overflow period of 60 seconds and disables Timer 1 (and itself) on first overflow</a:t>
+            </a:r>
+          </a:p>
+          <a:p>
+            <a:pPr lvl="2"/>
+            <a:r>
+              <a:rPr lang="en-US" dirty="0" smtClean="0"/>
+              <a:t>Timer 2 has a pre-scaler value of 16000 and counter period of 30000 and clock frequency of 8 MHz</a:t>
+            </a:r>
+          </a:p>
+          <a:p>
+            <a:pPr lvl="3"/>
+            <a:r>
+              <a:rPr lang="en-US" dirty="0" smtClean="0"/>
+              <a:t>Timer 2 period = 16000 * 30000 / 8000000 = 60 seconds</a:t>
+            </a:r>
+            <a:endParaRPr lang="en-US" dirty="0"/>
+          </a:p>
+        </p:txBody>
+      </p:sp>
     </p:spTree>
     <p:extLst>
       <p:ext uri="{BB962C8B-B14F-4D97-AF65-F5344CB8AC3E}">
-        <p14:creationId xmlns:p14="http://schemas.microsoft.com/office/powerpoint/2010/main" val="4151907949"/>
+        <p14:creationId xmlns:p14="http://schemas.microsoft.com/office/powerpoint/2010/main" val="1999252500"/>
       </p:ext>
     </p:extLst>
   </p:cSld>
@@ -3905,85 +3946,42 @@
           <a:p>
             <a:r>
               <a:rPr lang="en-US" dirty="0" smtClean="0"/>
-              <a:t>Calculating heart rate</a:t>
-            </a:r>
-            <a:endParaRPr lang="en-US" dirty="0"/>
-          </a:p>
-        </p:txBody>
-      </p:sp>
-      <p:sp>
-        <p:nvSpPr>
-          <p:cNvPr id="3" name="Content Placeholder 2"/>
-          <p:cNvSpPr>
-            <a:spLocks noGrp="1"/>
-          </p:cNvSpPr>
+              <a:t>Timer interrupt callbacks</a:t>
+            </a:r>
+            <a:endParaRPr lang="en-US" dirty="0"/>
+          </a:p>
+        </p:txBody>
+      </p:sp>
+      <p:pic>
+        <p:nvPicPr>
+          <p:cNvPr id="4" name="Content Placeholder 3"/>
+          <p:cNvPicPr>
+            <a:picLocks noGrp="1" noChangeAspect="1"/>
+          </p:cNvPicPr>
           <p:nvPr>
             <p:ph idx="1"/>
           </p:nvPr>
-        </p:nvSpPr>
-        <p:spPr/>
-        <p:txBody>
-          <a:bodyPr/>
-          <a:lstStyle/>
-          <a:p>
-            <a:r>
-              <a:rPr lang="en-US" dirty="0" smtClean="0"/>
-              <a:t>Serial command “a”</a:t>
-            </a:r>
-          </a:p>
-          <a:p>
-            <a:r>
-              <a:rPr lang="en-US" dirty="0" smtClean="0"/>
-              <a:t>Enables Timer 3 which has an overflow period of 10 </a:t>
-            </a:r>
-            <a:r>
-              <a:rPr lang="en-US" dirty="0" err="1" smtClean="0"/>
-              <a:t>ms</a:t>
-            </a:r>
-            <a:r>
-              <a:rPr lang="en-US" dirty="0" smtClean="0"/>
-              <a:t> to collect ADC data for 3 seconds</a:t>
-            </a:r>
-          </a:p>
-          <a:p>
-            <a:pPr lvl="1"/>
-            <a:r>
-              <a:rPr lang="en-US" dirty="0" smtClean="0"/>
-              <a:t>Timer 3 has a pre-scaler value of 800 and a counter period of 100</a:t>
-            </a:r>
-          </a:p>
-          <a:p>
-            <a:pPr lvl="1"/>
-            <a:r>
-              <a:rPr lang="en-US" dirty="0" smtClean="0"/>
-              <a:t>Period = 800 * 100 / 8000000 = 0.01 s = 10 </a:t>
-            </a:r>
-            <a:r>
-              <a:rPr lang="en-US" dirty="0" err="1" smtClean="0"/>
-              <a:t>ms</a:t>
-            </a:r>
-            <a:endParaRPr lang="en-US" dirty="0" smtClean="0"/>
-          </a:p>
-          <a:p>
-            <a:pPr lvl="1"/>
-            <a:r>
-              <a:rPr lang="en-US" dirty="0" smtClean="0"/>
-              <a:t>300 data points are collected</a:t>
-            </a:r>
-          </a:p>
-          <a:p>
-            <a:r>
-              <a:rPr lang="en-US" dirty="0" smtClean="0"/>
-              <a:t>Collected data points are analyzed to determine the heart rate</a:t>
-            </a:r>
-            <a:endParaRPr lang="en-US" dirty="0"/>
-          </a:p>
-        </p:txBody>
-      </p:sp>
+        </p:nvPicPr>
+        <p:blipFill>
+          <a:blip r:embed="rId2"/>
+          <a:stretch>
+            <a:fillRect/>
+          </a:stretch>
+        </p:blipFill>
+        <p:spPr>
+          <a:xfrm>
+            <a:off x="2450225" y="2203269"/>
+            <a:ext cx="7605982" cy="2722721"/>
+          </a:xfrm>
+          <a:prstGeom prst="rect">
+            <a:avLst/>
+          </a:prstGeom>
+        </p:spPr>
+      </p:pic>
     </p:spTree>
     <p:extLst>
       <p:ext uri="{BB962C8B-B14F-4D97-AF65-F5344CB8AC3E}">
-        <p14:creationId xmlns:p14="http://schemas.microsoft.com/office/powerpoint/2010/main" val="1761038134"/>
+        <p14:creationId xmlns:p14="http://schemas.microsoft.com/office/powerpoint/2010/main" val="4151907949"/>
       </p:ext>
     </p:extLst>
   </p:cSld>
@@ -4027,7 +4025,7 @@
           <a:p>
             <a:r>
               <a:rPr lang="en-US" dirty="0" smtClean="0"/>
-              <a:t>Heart rate algorithm (tentative)</a:t>
+              <a:t>Calculating heart rate</a:t>
             </a:r>
             <a:endParaRPr lang="en-US" dirty="0"/>
           </a:p>
@@ -4043,93 +4041,69 @@
             <p:ph idx="1"/>
           </p:nvPr>
         </p:nvSpPr>
-        <p:spPr>
-          <a:xfrm>
-            <a:off x="715108" y="2015732"/>
-            <a:ext cx="7624396" cy="4080268"/>
-          </a:xfrm>
-        </p:spPr>
-        <p:txBody>
-          <a:bodyPr>
-            <a:normAutofit/>
-          </a:bodyPr>
-          <a:lstStyle/>
-          <a:p>
-            <a:r>
-              <a:rPr lang="en-US" dirty="0" smtClean="0"/>
-              <a:t>The first peak is identified in the 3 seconds window</a:t>
+        <p:spPr/>
+        <p:txBody>
+          <a:bodyPr/>
+          <a:lstStyle/>
+          <a:p>
+            <a:r>
+              <a:rPr lang="en-US" dirty="0" smtClean="0"/>
+              <a:t>Serial command “a”</a:t>
+            </a:r>
+          </a:p>
+          <a:p>
+            <a:r>
+              <a:rPr lang="en-US" dirty="0" smtClean="0"/>
+              <a:t>Enables Timer 3 which has an overflow period of 10 </a:t>
+            </a:r>
+            <a:r>
+              <a:rPr lang="en-US" dirty="0" err="1" smtClean="0"/>
+              <a:t>ms</a:t>
+            </a:r>
+            <a:r>
+              <a:rPr lang="en-US" dirty="0" smtClean="0"/>
+              <a:t> to collect ADC data for 3 seconds</a:t>
             </a:r>
           </a:p>
           <a:p>
             <a:pPr lvl="1"/>
             <a:r>
               <a:rPr lang="en-US" dirty="0" smtClean="0"/>
-              <a:t>A peak is defined as a data point with a larger value than the 10 surrounding point</a:t>
-            </a:r>
-          </a:p>
-          <a:p>
-            <a:r>
-              <a:rPr lang="en-US" dirty="0" smtClean="0"/>
-              <a:t>The next peak is identified, with peaks within 300 milliseconds of the first peak ignored</a:t>
+              <a:t>Timer 3 has a pre-scaler value of 800 and a counter period of 100</a:t>
             </a:r>
           </a:p>
           <a:p>
             <a:pPr lvl="1"/>
             <a:r>
               <a:rPr lang="en-US" dirty="0" smtClean="0"/>
-              <a:t>Peaks are not necessarily QRS complex; they could be P or T waves</a:t>
-            </a:r>
+              <a:t>Period = 800 * 100 / 8000000 = 0.01 s = 10 </a:t>
+            </a:r>
+            <a:r>
+              <a:rPr lang="en-US" dirty="0" err="1" smtClean="0"/>
+              <a:t>ms</a:t>
+            </a:r>
+            <a:endParaRPr lang="en-US" dirty="0" smtClean="0"/>
           </a:p>
           <a:p>
             <a:pPr lvl="1"/>
             <a:r>
               <a:rPr lang="en-US" dirty="0" smtClean="0"/>
-              <a:t>This is to ignore P or T waves posing as QRS complex</a:t>
-            </a:r>
-          </a:p>
-          <a:p>
-            <a:r>
-              <a:rPr lang="en-US" dirty="0" smtClean="0"/>
-              <a:t>The period of the heart rate is the time difference of the two peaks</a:t>
-            </a:r>
-          </a:p>
-          <a:p>
-            <a:pPr lvl="1"/>
-            <a:r>
-              <a:rPr lang="en-US" dirty="0" smtClean="0"/>
-              <a:t>Heart rate in BPM = 60 / period (in seconds)</a:t>
-            </a:r>
-          </a:p>
-        </p:txBody>
-      </p:sp>
-      <p:pic>
-        <p:nvPicPr>
-          <p:cNvPr id="4" name="Picture 3"/>
-          <p:cNvPicPr>
-            <a:picLocks noChangeAspect="1"/>
-          </p:cNvPicPr>
-          <p:nvPr/>
-        </p:nvPicPr>
-        <p:blipFill>
-          <a:blip r:embed="rId2"/>
-          <a:stretch>
-            <a:fillRect/>
-          </a:stretch>
-        </p:blipFill>
-        <p:spPr>
-          <a:xfrm>
-            <a:off x="8339504" y="2645663"/>
-            <a:ext cx="3695700" cy="2190750"/>
-          </a:xfrm>
-          <a:prstGeom prst="rect">
-            <a:avLst/>
-          </a:prstGeom>
-        </p:spPr>
-      </p:pic>
+              <a:t>300 data points are collected</a:t>
+            </a:r>
+          </a:p>
+          <a:p>
+            <a:r>
+              <a:rPr lang="en-US" dirty="0" smtClean="0"/>
+              <a:t>Collected data points are analyzed to determine the heart rate</a:t>
+            </a:r>
+            <a:endParaRPr lang="en-US" dirty="0"/>
+          </a:p>
+        </p:txBody>
+      </p:sp>
     </p:spTree>
     <p:extLst>
       <p:ext uri="{BB962C8B-B14F-4D97-AF65-F5344CB8AC3E}">
-        <p14:creationId xmlns:p14="http://schemas.microsoft.com/office/powerpoint/2010/main" val="1499841881"/>
+        <p14:creationId xmlns:p14="http://schemas.microsoft.com/office/powerpoint/2010/main" val="1761038134"/>
       </p:ext>
     </p:extLst>
   </p:cSld>
@@ -4173,29 +4147,87 @@
           <a:p>
             <a:r>
               <a:rPr lang="en-US" dirty="0" smtClean="0"/>
-              <a:t>Heart </a:t>
-            </a:r>
-            <a:r>
-              <a:rPr lang="en-US" smtClean="0"/>
-              <a:t>rate Algorithm </a:t>
-            </a:r>
-            <a:r>
-              <a:rPr lang="en-US" dirty="0" smtClean="0"/>
-              <a:t>implementation</a:t>
-            </a:r>
-            <a:endParaRPr lang="en-US" dirty="0"/>
+              <a:t>Heart rate algorithm (tentative)</a:t>
+            </a:r>
+            <a:endParaRPr lang="en-US" dirty="0"/>
+          </a:p>
+        </p:txBody>
+      </p:sp>
+      <p:sp>
+        <p:nvSpPr>
+          <p:cNvPr id="3" name="Content Placeholder 2"/>
+          <p:cNvSpPr>
+            <a:spLocks noGrp="1"/>
+          </p:cNvSpPr>
+          <p:nvPr>
+            <p:ph idx="1"/>
+          </p:nvPr>
+        </p:nvSpPr>
+        <p:spPr>
+          <a:xfrm>
+            <a:off x="715108" y="2015732"/>
+            <a:ext cx="7624396" cy="4080268"/>
+          </a:xfrm>
+        </p:spPr>
+        <p:txBody>
+          <a:bodyPr>
+            <a:normAutofit/>
+          </a:bodyPr>
+          <a:lstStyle/>
+          <a:p>
+            <a:r>
+              <a:rPr lang="en-US" dirty="0" smtClean="0"/>
+              <a:t>The first peak is identified in the 3 seconds window</a:t>
+            </a:r>
+          </a:p>
+          <a:p>
+            <a:pPr lvl="1"/>
+            <a:r>
+              <a:rPr lang="en-US" dirty="0" smtClean="0"/>
+              <a:t>A peak is defined as a data point with a larger value than the </a:t>
+            </a:r>
+            <a:r>
+              <a:rPr lang="en-US" dirty="0" smtClean="0"/>
+              <a:t>60 surrounding points</a:t>
+            </a:r>
+            <a:endParaRPr lang="en-US" dirty="0" smtClean="0"/>
+          </a:p>
+          <a:p>
+            <a:r>
+              <a:rPr lang="en-US" dirty="0" smtClean="0"/>
+              <a:t>The next peak is </a:t>
+            </a:r>
+            <a:r>
+              <a:rPr lang="en-US" dirty="0" smtClean="0"/>
+              <a:t>identified in the same way</a:t>
+            </a:r>
+          </a:p>
+          <a:p>
+            <a:r>
+              <a:rPr lang="en-US" dirty="0" smtClean="0"/>
+              <a:t>The </a:t>
+            </a:r>
+            <a:r>
+              <a:rPr lang="en-US" dirty="0" smtClean="0"/>
+              <a:t>period of the heart rate is the time difference of the two peaks</a:t>
+            </a:r>
+          </a:p>
+          <a:p>
+            <a:pPr lvl="1"/>
+            <a:r>
+              <a:rPr lang="en-US" dirty="0" smtClean="0"/>
+              <a:t>Heart rate in BPM = 60 / period (in seconds)</a:t>
+            </a:r>
           </a:p>
         </p:txBody>
       </p:sp>
       <p:pic>
         <p:nvPicPr>
-          <p:cNvPr id="4" name="Content Placeholder 3"/>
+          <p:cNvPr id="4" name="Picture 3"/>
           <p:cNvPicPr>
-            <a:picLocks noGrp="1" noChangeAspect="1"/>
+            <a:picLocks noChangeAspect="1"/>
           </p:cNvPicPr>
-          <p:nvPr>
-            <p:ph idx="1"/>
-          </p:nvPr>
+          <p:nvPr/>
         </p:nvPicPr>
         <p:blipFill>
           <a:blip r:embed="rId2"/>
@@ -4205,32 +4237,8 @@
         </p:blipFill>
         <p:spPr>
           <a:xfrm>
-            <a:off x="223892" y="2089989"/>
-            <a:ext cx="5001252" cy="2709999"/>
-          </a:xfrm>
-          <a:prstGeom prst="rect">
-            <a:avLst/>
-          </a:prstGeom>
-        </p:spPr>
-      </p:pic>
-      <p:pic>
-        <p:nvPicPr>
-          <p:cNvPr id="5" name="Picture 4"/>
-          <p:cNvPicPr>
-            <a:picLocks noChangeAspect="1"/>
-          </p:cNvPicPr>
-          <p:nvPr/>
-        </p:nvPicPr>
-        <p:blipFill>
-          <a:blip r:embed="rId3"/>
-          <a:stretch>
-            <a:fillRect/>
-          </a:stretch>
-        </p:blipFill>
-        <p:spPr>
-          <a:xfrm>
-            <a:off x="5712823" y="2089989"/>
-            <a:ext cx="5547360" cy="4079396"/>
+            <a:off x="8339504" y="2645663"/>
+            <a:ext cx="3695700" cy="2190750"/>
           </a:xfrm>
           <a:prstGeom prst="rect">
             <a:avLst/>
@@ -4240,7 +4248,7 @@
     </p:spTree>
     <p:extLst>
       <p:ext uri="{BB962C8B-B14F-4D97-AF65-F5344CB8AC3E}">
-        <p14:creationId xmlns:p14="http://schemas.microsoft.com/office/powerpoint/2010/main" val="1610309281"/>
+        <p14:creationId xmlns:p14="http://schemas.microsoft.com/office/powerpoint/2010/main" val="1499841881"/>
       </p:ext>
     </p:extLst>
   </p:cSld>
@@ -4284,86 +4292,29 @@
           <a:p>
             <a:r>
               <a:rPr lang="en-US" dirty="0" smtClean="0"/>
-              <a:t>PC Side</a:t>
-            </a:r>
-            <a:endParaRPr lang="en-US" dirty="0"/>
-          </a:p>
-        </p:txBody>
-      </p:sp>
-      <p:sp>
-        <p:nvSpPr>
-          <p:cNvPr id="3" name="Content Placeholder 2"/>
-          <p:cNvSpPr>
-            <a:spLocks noGrp="1"/>
-          </p:cNvSpPr>
-          <p:nvPr>
-            <p:ph idx="1"/>
-          </p:nvPr>
-        </p:nvSpPr>
-        <p:spPr>
-          <a:xfrm>
-            <a:off x="1451580" y="2015733"/>
-            <a:ext cx="10107374" cy="2028730"/>
-          </a:xfrm>
-        </p:spPr>
-        <p:txBody>
-          <a:bodyPr>
-            <a:normAutofit fontScale="92500" lnSpcReduction="10000"/>
-          </a:bodyPr>
-          <a:lstStyle/>
-          <a:p>
-            <a:r>
-              <a:rPr lang="en-US" dirty="0" smtClean="0"/>
-              <a:t>PC application running on top of Python and </a:t>
-            </a:r>
-            <a:r>
-              <a:rPr lang="en-US" dirty="0" err="1" smtClean="0"/>
-              <a:t>Tkinter</a:t>
-            </a:r>
-            <a:r>
-              <a:rPr lang="en-US" dirty="0" smtClean="0"/>
-              <a:t> for GUI</a:t>
-            </a:r>
-          </a:p>
-          <a:p>
-            <a:r>
-              <a:rPr lang="en-US" dirty="0" smtClean="0"/>
-              <a:t>Connected to the microcontroller via serial connection</a:t>
-            </a:r>
-          </a:p>
-          <a:p>
-            <a:pPr lvl="1"/>
-            <a:r>
-              <a:rPr lang="en-US" dirty="0" err="1" smtClean="0"/>
-              <a:t>pySerial</a:t>
-            </a:r>
-            <a:r>
-              <a:rPr lang="en-US" dirty="0" smtClean="0"/>
-              <a:t> on the PC side</a:t>
-            </a:r>
-          </a:p>
-          <a:p>
-            <a:pPr lvl="1"/>
-            <a:r>
-              <a:rPr lang="en-US" dirty="0" smtClean="0"/>
-              <a:t>UART module on the MCU side</a:t>
-            </a:r>
-          </a:p>
-          <a:p>
-            <a:r>
-              <a:rPr lang="en-US" dirty="0" smtClean="0"/>
-              <a:t>GUI allows user to select the COM port and the baud rate to connect with the microcontroller</a:t>
-            </a:r>
+              <a:t>Heart </a:t>
+            </a:r>
+            <a:r>
+              <a:rPr lang="en-US" smtClean="0"/>
+              <a:t>rate Algorithm </a:t>
+            </a:r>
+            <a:r>
+              <a:rPr lang="en-US" dirty="0" smtClean="0"/>
+              <a:t>implementation</a:t>
+            </a:r>
+            <a:endParaRPr lang="en-US" dirty="0"/>
           </a:p>
         </p:txBody>
       </p:sp>
       <p:pic>
         <p:nvPicPr>
-          <p:cNvPr id="5" name="Picture 4"/>
+          <p:cNvPr id="6" name="Content Placeholder 5"/>
           <p:cNvPicPr>
-            <a:picLocks noChangeAspect="1"/>
+            <a:picLocks noGrp="1" noChangeAspect="1"/>
           </p:cNvPicPr>
-          <p:nvPr/>
+          <p:nvPr>
+            <p:ph idx="1"/>
+          </p:nvPr>
         </p:nvPicPr>
         <p:blipFill>
           <a:blip r:embed="rId2"/>
@@ -4373,8 +4324,32 @@
         </p:blipFill>
         <p:spPr>
           <a:xfrm>
-            <a:off x="3262366" y="4218167"/>
-            <a:ext cx="5981700" cy="1552575"/>
+            <a:off x="525970" y="3194616"/>
+            <a:ext cx="5553075" cy="657225"/>
+          </a:xfrm>
+          <a:prstGeom prst="rect">
+            <a:avLst/>
+          </a:prstGeom>
+        </p:spPr>
+      </p:pic>
+      <p:pic>
+        <p:nvPicPr>
+          <p:cNvPr id="7" name="Picture 6"/>
+          <p:cNvPicPr>
+            <a:picLocks noChangeAspect="1"/>
+          </p:cNvPicPr>
+          <p:nvPr/>
+        </p:nvPicPr>
+        <p:blipFill>
+          <a:blip r:embed="rId3"/>
+          <a:stretch>
+            <a:fillRect/>
+          </a:stretch>
+        </p:blipFill>
+        <p:spPr>
+          <a:xfrm>
+            <a:off x="6167710" y="2488475"/>
+            <a:ext cx="5743575" cy="3048000"/>
           </a:xfrm>
           <a:prstGeom prst="rect">
             <a:avLst/>
@@ -4384,7 +4359,7 @@
     </p:spTree>
     <p:extLst>
       <p:ext uri="{BB962C8B-B14F-4D97-AF65-F5344CB8AC3E}">
-        <p14:creationId xmlns:p14="http://schemas.microsoft.com/office/powerpoint/2010/main" val="136189752"/>
+        <p14:creationId xmlns:p14="http://schemas.microsoft.com/office/powerpoint/2010/main" val="1610309281"/>
       </p:ext>
     </p:extLst>
   </p:cSld>
@@ -4428,15 +4403,15 @@
           <a:p>
             <a:r>
               <a:rPr lang="en-US" dirty="0" smtClean="0"/>
-              <a:t>COMMANDS GUI</a:t>
-            </a:r>
-            <a:endParaRPr lang="en-US" dirty="0"/>
-          </a:p>
-        </p:txBody>
-      </p:sp>
-      <p:sp>
-        <p:nvSpPr>
-          <p:cNvPr id="5" name="Content Placeholder 4"/>
+              <a:t>PC Side</a:t>
+            </a:r>
+            <a:endParaRPr lang="en-US" dirty="0"/>
+          </a:p>
+        </p:txBody>
+      </p:sp>
+      <p:sp>
+        <p:nvSpPr>
+          <p:cNvPr id="3" name="Content Placeholder 2"/>
           <p:cNvSpPr>
             <a:spLocks noGrp="1"/>
           </p:cNvSpPr>
@@ -4446,55 +4421,64 @@
         </p:nvSpPr>
         <p:spPr>
           <a:xfrm>
-            <a:off x="1451580" y="2015732"/>
-            <a:ext cx="4761652" cy="3450613"/>
-          </a:xfrm>
-        </p:spPr>
-        <p:txBody>
-          <a:bodyPr/>
-          <a:lstStyle/>
-          <a:p>
-            <a:r>
-              <a:rPr lang="en-US" dirty="0" smtClean="0"/>
-              <a:t>Three commands are available to users</a:t>
-            </a:r>
-          </a:p>
-          <a:p>
-            <a:pPr marL="800100" lvl="1" indent="-342900">
-              <a:buFont typeface="+mj-lt"/>
-              <a:buAutoNum type="arabicPeriod"/>
-            </a:pPr>
-            <a:r>
-              <a:rPr lang="en-US" dirty="0" smtClean="0"/>
-              <a:t>Setting sampling rate. Must enter a valid positive integer</a:t>
-            </a:r>
-          </a:p>
-          <a:p>
-            <a:pPr marL="800100" lvl="1" indent="-342900">
-              <a:buFont typeface="+mj-lt"/>
-              <a:buAutoNum type="arabicPeriod"/>
-            </a:pPr>
-            <a:r>
-              <a:rPr lang="en-US" dirty="0" smtClean="0"/>
-              <a:t>Displaying one minute worth of data (check next slide for details)</a:t>
-            </a:r>
-          </a:p>
-          <a:p>
-            <a:pPr marL="800100" lvl="1" indent="-342900">
-              <a:buFont typeface="+mj-lt"/>
-              <a:buAutoNum type="arabicPeriod"/>
-            </a:pPr>
-            <a:r>
-              <a:rPr lang="en-US" dirty="0" smtClean="0"/>
-              <a:t>Calculating the heart rate in BPM (jump two slides forward)</a:t>
-            </a:r>
-            <a:endParaRPr lang="en-US" dirty="0"/>
+            <a:off x="1451580" y="2015733"/>
+            <a:ext cx="10107374" cy="2028730"/>
+          </a:xfrm>
+        </p:spPr>
+        <p:txBody>
+          <a:bodyPr>
+            <a:normAutofit fontScale="92500" lnSpcReduction="10000"/>
+          </a:bodyPr>
+          <a:lstStyle/>
+          <a:p>
+            <a:r>
+              <a:rPr lang="en-US" dirty="0" smtClean="0"/>
+              <a:t>PC application running on top of Python and </a:t>
+            </a:r>
+            <a:r>
+              <a:rPr lang="en-US" dirty="0" err="1" smtClean="0"/>
+              <a:t>Tkinter</a:t>
+            </a:r>
+            <a:r>
+              <a:rPr lang="en-US" dirty="0" smtClean="0"/>
+              <a:t> for GUI</a:t>
+            </a:r>
+          </a:p>
+          <a:p>
+            <a:r>
+              <a:rPr lang="en-US" dirty="0" smtClean="0"/>
+              <a:t>Connected to the microcontroller via serial connection</a:t>
+            </a:r>
+          </a:p>
+          <a:p>
+            <a:pPr lvl="1"/>
+            <a:r>
+              <a:rPr lang="en-US" dirty="0" err="1" smtClean="0"/>
+              <a:t>pySerial</a:t>
+            </a:r>
+            <a:r>
+              <a:rPr lang="en-US" dirty="0" smtClean="0"/>
+              <a:t> on the PC side</a:t>
+            </a:r>
+          </a:p>
+          <a:p>
+            <a:pPr lvl="1"/>
+            <a:r>
+              <a:rPr lang="en-US" dirty="0" smtClean="0"/>
+              <a:t>UART module on the MCU side</a:t>
+            </a:r>
+          </a:p>
+          <a:p>
+            <a:r>
+              <a:rPr lang="en-US" dirty="0" smtClean="0"/>
+              <a:t>GUI allows user to select the COM port and the baud rate to connect with the microcontroller</a:t>
+            </a:r>
           </a:p>
         </p:txBody>
       </p:sp>
       <p:pic>
         <p:nvPicPr>
-          <p:cNvPr id="6" name="Picture 5"/>
+          <p:cNvPr id="4" name="Picture 3"/>
           <p:cNvPicPr>
             <a:picLocks noChangeAspect="1"/>
           </p:cNvPicPr>
@@ -4508,8 +4492,8 @@
         </p:blipFill>
         <p:spPr>
           <a:xfrm>
-            <a:off x="7211615" y="2219954"/>
-            <a:ext cx="4310246" cy="3042168"/>
+            <a:off x="3262366" y="4206442"/>
+            <a:ext cx="5981700" cy="1600200"/>
           </a:xfrm>
           <a:prstGeom prst="rect">
             <a:avLst/>
@@ -4519,7 +4503,7 @@
     </p:spTree>
     <p:extLst>
       <p:ext uri="{BB962C8B-B14F-4D97-AF65-F5344CB8AC3E}">
-        <p14:creationId xmlns:p14="http://schemas.microsoft.com/office/powerpoint/2010/main" val="811174978"/>
+        <p14:creationId xmlns:p14="http://schemas.microsoft.com/office/powerpoint/2010/main" val="136189752"/>
       </p:ext>
     </p:extLst>
   </p:cSld>
@@ -4563,15 +4547,15 @@
           <a:p>
             <a:r>
               <a:rPr lang="en-US" dirty="0" smtClean="0"/>
-              <a:t>Displaying ECG Data in real time</a:t>
-            </a:r>
-            <a:endParaRPr lang="en-US" dirty="0"/>
-          </a:p>
-        </p:txBody>
-      </p:sp>
-      <p:sp>
-        <p:nvSpPr>
-          <p:cNvPr id="3" name="Content Placeholder 2"/>
+              <a:t>COMMANDS GUI</a:t>
+            </a:r>
+            <a:endParaRPr lang="en-US" dirty="0"/>
+          </a:p>
+        </p:txBody>
+      </p:sp>
+      <p:sp>
+        <p:nvSpPr>
+          <p:cNvPr id="5" name="Content Placeholder 4"/>
           <p:cNvSpPr>
             <a:spLocks noGrp="1"/>
           </p:cNvSpPr>
@@ -4582,28 +4566,46 @@
         <p:spPr>
           <a:xfrm>
             <a:off x="1451580" y="2015732"/>
-            <a:ext cx="5523652" cy="3450613"/>
-          </a:xfrm>
-        </p:spPr>
-        <p:txBody>
-          <a:bodyPr/>
-          <a:lstStyle/>
-          <a:p>
-            <a:r>
-              <a:rPr lang="en-US" dirty="0" smtClean="0"/>
-              <a:t>Choosing to display continuous ECG data, the app issues a serial command to the MCU (“b”)</a:t>
-            </a:r>
-          </a:p>
-          <a:p>
-            <a:r>
-              <a:rPr lang="en-US" dirty="0" smtClean="0"/>
-              <a:t>The MCU returns continuous readings for 60 seconds at the specified sampling rate </a:t>
-            </a:r>
-          </a:p>
-          <a:p>
-            <a:r>
-              <a:rPr lang="en-US" dirty="0" smtClean="0"/>
-              <a:t>The app displays a screen that is updated in real time of the ECG data</a:t>
+            <a:ext cx="4761652" cy="3450613"/>
+          </a:xfrm>
+        </p:spPr>
+        <p:txBody>
+          <a:bodyPr/>
+          <a:lstStyle/>
+          <a:p>
+            <a:r>
+              <a:rPr lang="en-US" dirty="0" smtClean="0"/>
+              <a:t>Three commands are available to users</a:t>
+            </a:r>
+          </a:p>
+          <a:p>
+            <a:pPr marL="800100" lvl="1" indent="-342900">
+              <a:buFont typeface="+mj-lt"/>
+              <a:buAutoNum type="arabicPeriod"/>
+            </a:pPr>
+            <a:r>
+              <a:rPr lang="en-US" dirty="0" smtClean="0"/>
+              <a:t>Setting sampling rate. Must enter a valid positive integer</a:t>
+            </a:r>
+          </a:p>
+          <a:p>
+            <a:pPr marL="800100" lvl="1" indent="-342900">
+              <a:buFont typeface="+mj-lt"/>
+              <a:buAutoNum type="arabicPeriod"/>
+            </a:pPr>
+            <a:r>
+              <a:rPr lang="en-US" dirty="0" smtClean="0"/>
+              <a:t>Displaying one minute worth of data (check next slide for details)</a:t>
+            </a:r>
+          </a:p>
+          <a:p>
+            <a:pPr marL="800100" lvl="1" indent="-342900">
+              <a:buFont typeface="+mj-lt"/>
+              <a:buAutoNum type="arabicPeriod"/>
+            </a:pPr>
+            <a:r>
+              <a:rPr lang="en-US" dirty="0" smtClean="0"/>
+              <a:t>Calculating the heart rate in BPM (jump two slides forward)</a:t>
             </a:r>
             <a:endParaRPr lang="en-US" dirty="0"/>
           </a:p>
@@ -4611,7 +4613,7 @@
       </p:sp>
       <p:pic>
         <p:nvPicPr>
-          <p:cNvPr id="4" name="Picture 3"/>
+          <p:cNvPr id="6" name="Picture 5"/>
           <p:cNvPicPr>
             <a:picLocks noChangeAspect="1"/>
           </p:cNvPicPr>
@@ -4625,8 +4627,8 @@
         </p:blipFill>
         <p:spPr>
           <a:xfrm>
-            <a:off x="7069016" y="2073997"/>
-            <a:ext cx="3761642" cy="3392348"/>
+            <a:off x="7211615" y="2219954"/>
+            <a:ext cx="4310246" cy="3042168"/>
           </a:xfrm>
           <a:prstGeom prst="rect">
             <a:avLst/>
@@ -4636,7 +4638,7 @@
     </p:spTree>
     <p:extLst>
       <p:ext uri="{BB962C8B-B14F-4D97-AF65-F5344CB8AC3E}">
-        <p14:creationId xmlns:p14="http://schemas.microsoft.com/office/powerpoint/2010/main" val="3040397417"/>
+        <p14:creationId xmlns:p14="http://schemas.microsoft.com/office/powerpoint/2010/main" val="811174978"/>
       </p:ext>
     </p:extLst>
   </p:cSld>
@@ -4680,7 +4682,7 @@
           <a:p>
             <a:r>
               <a:rPr lang="en-US" dirty="0" smtClean="0"/>
-              <a:t>Calculating heart rate</a:t>
+              <a:t>Displaying ECG Data in real time</a:t>
             </a:r>
             <a:endParaRPr lang="en-US" dirty="0"/>
           </a:p>
@@ -4699,28 +4701,28 @@
         <p:spPr>
           <a:xfrm>
             <a:off x="1451580" y="2015732"/>
-            <a:ext cx="4914052" cy="3450613"/>
-          </a:xfrm>
-        </p:spPr>
-        <p:txBody>
-          <a:bodyPr/>
-          <a:lstStyle/>
-          <a:p>
-            <a:r>
-              <a:rPr lang="en-US" dirty="0" smtClean="0"/>
-              <a:t>The PC app issues a serial command to the MCU “a”</a:t>
-            </a:r>
-          </a:p>
-          <a:p>
-            <a:r>
-              <a:rPr lang="en-US" dirty="0" smtClean="0"/>
-              <a:t>The MCU performs the algorithm outlined in slide 11</a:t>
-            </a:r>
-          </a:p>
-          <a:p>
-            <a:r>
-              <a:rPr lang="en-US" dirty="0" smtClean="0"/>
-              <a:t>The value is displayed to the user </a:t>
+            <a:ext cx="5523652" cy="3450613"/>
+          </a:xfrm>
+        </p:spPr>
+        <p:txBody>
+          <a:bodyPr/>
+          <a:lstStyle/>
+          <a:p>
+            <a:r>
+              <a:rPr lang="en-US" dirty="0" smtClean="0"/>
+              <a:t>Choosing to display continuous ECG data, the app issues a serial command to the MCU (“b”)</a:t>
+            </a:r>
+          </a:p>
+          <a:p>
+            <a:r>
+              <a:rPr lang="en-US" dirty="0" smtClean="0"/>
+              <a:t>The MCU returns continuous readings for 60 seconds at the specified sampling rate </a:t>
+            </a:r>
+          </a:p>
+          <a:p>
+            <a:r>
+              <a:rPr lang="en-US" dirty="0" smtClean="0"/>
+              <a:t>The app displays a screen that is updated in real time of the ECG data</a:t>
             </a:r>
             <a:endParaRPr lang="en-US" dirty="0"/>
           </a:p>
@@ -4742,8 +4744,8 @@
         </p:blipFill>
         <p:spPr>
           <a:xfrm>
-            <a:off x="7104917" y="2015732"/>
-            <a:ext cx="3633097" cy="3450613"/>
+            <a:off x="7069016" y="2073997"/>
+            <a:ext cx="3761642" cy="3392348"/>
           </a:xfrm>
           <a:prstGeom prst="rect">
             <a:avLst/>
@@ -4753,7 +4755,7 @@
     </p:spTree>
     <p:extLst>
       <p:ext uri="{BB962C8B-B14F-4D97-AF65-F5344CB8AC3E}">
-        <p14:creationId xmlns:p14="http://schemas.microsoft.com/office/powerpoint/2010/main" val="4034051438"/>
+        <p14:creationId xmlns:p14="http://schemas.microsoft.com/office/powerpoint/2010/main" val="3040397417"/>
       </p:ext>
     </p:extLst>
   </p:cSld>
@@ -4797,7 +4799,7 @@
           <a:p>
             <a:r>
               <a:rPr lang="en-US" dirty="0" smtClean="0"/>
-              <a:t>Future steps</a:t>
+              <a:t>Calculating heart rate</a:t>
             </a:r>
             <a:endParaRPr lang="en-US" dirty="0"/>
           </a:p>
@@ -4815,73 +4817,62 @@
         </p:nvSpPr>
         <p:spPr>
           <a:xfrm>
-            <a:off x="1451579" y="2015732"/>
-            <a:ext cx="9603275" cy="3986483"/>
-          </a:xfrm>
-        </p:spPr>
-        <p:txBody>
-          <a:bodyPr>
-            <a:normAutofit/>
-          </a:bodyPr>
-          <a:lstStyle/>
-          <a:p>
-            <a:r>
-              <a:rPr lang="en-US" dirty="0" smtClean="0"/>
-              <a:t>Improving the heart rate algorithm </a:t>
-            </a:r>
-          </a:p>
-          <a:p>
-            <a:r>
-              <a:rPr lang="en-US" dirty="0" smtClean="0"/>
-              <a:t>Adding a button to refresh the list of available COM ports at the connection screen</a:t>
-            </a:r>
-          </a:p>
-          <a:p>
-            <a:r>
-              <a:rPr lang="en-US" dirty="0" smtClean="0"/>
-              <a:t>Catching “PORT busy” errors gracefully</a:t>
-            </a:r>
-            <a:endParaRPr lang="en-US" dirty="0"/>
-          </a:p>
-          <a:p>
-            <a:r>
-              <a:rPr lang="en-US" dirty="0" smtClean="0"/>
-              <a:t>Specifying a default value for baud rate</a:t>
-            </a:r>
-          </a:p>
-          <a:p>
-            <a:r>
-              <a:rPr lang="en-US" dirty="0" smtClean="0"/>
-              <a:t>Specifying a maximum value for sampling rate</a:t>
-            </a:r>
-          </a:p>
-          <a:p>
-            <a:r>
-              <a:rPr lang="en-US" dirty="0" smtClean="0"/>
-              <a:t>Transmitting data serially as hex values instead of ASCII values</a:t>
-            </a:r>
-          </a:p>
-          <a:p>
-            <a:r>
-              <a:rPr lang="en-US" dirty="0" smtClean="0"/>
-              <a:t>Acknowledging the setting of a new sampling rate successfully in the GUI </a:t>
-            </a:r>
-          </a:p>
-          <a:p>
-            <a:r>
-              <a:rPr lang="en-US" dirty="0" smtClean="0"/>
-              <a:t>Disabling all commands while the 60 seconds of live data are not yet completed</a:t>
-            </a:r>
-          </a:p>
-          <a:p>
-            <a:endParaRPr lang="en-US" dirty="0"/>
-          </a:p>
-        </p:txBody>
-      </p:sp>
+            <a:off x="1451580" y="2015732"/>
+            <a:ext cx="4914052" cy="3450613"/>
+          </a:xfrm>
+        </p:spPr>
+        <p:txBody>
+          <a:bodyPr/>
+          <a:lstStyle/>
+          <a:p>
+            <a:r>
+              <a:rPr lang="en-US" dirty="0" smtClean="0"/>
+              <a:t>The PC app issues a serial command to the MCU “a”</a:t>
+            </a:r>
+          </a:p>
+          <a:p>
+            <a:r>
+              <a:rPr lang="en-US" dirty="0" smtClean="0"/>
+              <a:t>The MCU performs the algorithm outlined in slide 11</a:t>
+            </a:r>
+          </a:p>
+          <a:p>
+            <a:r>
+              <a:rPr lang="en-US" dirty="0" smtClean="0"/>
+              <a:t>The value is displayed to the user </a:t>
+            </a:r>
+            <a:endParaRPr lang="en-US" dirty="0"/>
+          </a:p>
+        </p:txBody>
+      </p:sp>
+      <p:pic>
+        <p:nvPicPr>
+          <p:cNvPr id="5" name="Picture 4"/>
+          <p:cNvPicPr>
+            <a:picLocks noChangeAspect="1"/>
+          </p:cNvPicPr>
+          <p:nvPr/>
+        </p:nvPicPr>
+        <p:blipFill>
+          <a:blip r:embed="rId2"/>
+          <a:stretch>
+            <a:fillRect/>
+          </a:stretch>
+        </p:blipFill>
+        <p:spPr>
+          <a:xfrm>
+            <a:off x="7236142" y="2015732"/>
+            <a:ext cx="4181475" cy="3924300"/>
+          </a:xfrm>
+          <a:prstGeom prst="rect">
+            <a:avLst/>
+          </a:prstGeom>
+        </p:spPr>
+      </p:pic>
     </p:spTree>
     <p:extLst>
       <p:ext uri="{BB962C8B-B14F-4D97-AF65-F5344CB8AC3E}">
-        <p14:creationId xmlns:p14="http://schemas.microsoft.com/office/powerpoint/2010/main" val="680108571"/>
+        <p14:creationId xmlns:p14="http://schemas.microsoft.com/office/powerpoint/2010/main" val="4034051438"/>
       </p:ext>
     </p:extLst>
   </p:cSld>
@@ -5490,72 +5481,42 @@
           <a:p>
             <a:r>
               <a:rPr lang="en-US" dirty="0" smtClean="0"/>
-              <a:t>Supported MCU Commands</a:t>
-            </a:r>
-            <a:endParaRPr lang="en-US" dirty="0"/>
-          </a:p>
-        </p:txBody>
-      </p:sp>
-      <p:sp>
-        <p:nvSpPr>
-          <p:cNvPr id="3" name="Content Placeholder 2"/>
-          <p:cNvSpPr>
-            <a:spLocks noGrp="1"/>
-          </p:cNvSpPr>
+              <a:t>The physical circuit</a:t>
+            </a:r>
+            <a:endParaRPr lang="en-US" dirty="0"/>
+          </a:p>
+        </p:txBody>
+      </p:sp>
+      <p:pic>
+        <p:nvPicPr>
+          <p:cNvPr id="4" name="Content Placeholder 3"/>
+          <p:cNvPicPr>
+            <a:picLocks noGrp="1" noChangeAspect="1"/>
+          </p:cNvPicPr>
           <p:nvPr>
             <p:ph idx="1"/>
           </p:nvPr>
-        </p:nvSpPr>
-        <p:spPr/>
-        <p:txBody>
-          <a:bodyPr/>
-          <a:lstStyle/>
-          <a:p>
-            <a:r>
-              <a:rPr lang="en-US" dirty="0" smtClean="0"/>
-              <a:t>“a”</a:t>
-            </a:r>
-          </a:p>
-          <a:p>
-            <a:pPr lvl="1"/>
-            <a:r>
-              <a:rPr lang="en-US" dirty="0" smtClean="0"/>
-              <a:t>Returns an integer representing the heart rate (after three seconds)</a:t>
-            </a:r>
-          </a:p>
-          <a:p>
-            <a:r>
-              <a:rPr lang="en-US" dirty="0" smtClean="0"/>
-              <a:t>“b”</a:t>
-            </a:r>
-          </a:p>
-          <a:p>
-            <a:pPr lvl="1"/>
-            <a:r>
-              <a:rPr lang="en-US" dirty="0" smtClean="0"/>
-              <a:t>Immediately starts returning ADC readings at the specified sampling rate for 60 seconds</a:t>
-            </a:r>
-          </a:p>
-          <a:p>
-            <a:r>
-              <a:rPr lang="en-US" dirty="0" smtClean="0"/>
-              <a:t>“c&lt;rate&gt;c” (example:  “c50c”)</a:t>
-            </a:r>
-          </a:p>
-          <a:p>
-            <a:pPr lvl="1"/>
-            <a:r>
-              <a:rPr lang="en-US" dirty="0" smtClean="0"/>
-              <a:t>Sets the ADC sampling rate to “rate” (in the example it becomes 50)</a:t>
-            </a:r>
-            <a:endParaRPr lang="en-US" dirty="0"/>
-          </a:p>
-        </p:txBody>
-      </p:sp>
+        </p:nvPicPr>
+        <p:blipFill>
+          <a:blip r:embed="rId2"/>
+          <a:stretch>
+            <a:fillRect/>
+          </a:stretch>
+        </p:blipFill>
+        <p:spPr>
+          <a:xfrm rot="5400000">
+            <a:off x="3596352" y="2320926"/>
+            <a:ext cx="4599517" cy="3449638"/>
+          </a:xfrm>
+          <a:prstGeom prst="rect">
+            <a:avLst/>
+          </a:prstGeom>
+        </p:spPr>
+      </p:pic>
     </p:spTree>
     <p:extLst>
       <p:ext uri="{BB962C8B-B14F-4D97-AF65-F5344CB8AC3E}">
-        <p14:creationId xmlns:p14="http://schemas.microsoft.com/office/powerpoint/2010/main" val="3212976985"/>
+        <p14:creationId xmlns:p14="http://schemas.microsoft.com/office/powerpoint/2010/main" val="65146869"/>
       </p:ext>
     </p:extLst>
   </p:cSld>
@@ -5599,42 +5560,72 @@
           <a:p>
             <a:r>
               <a:rPr lang="en-US" dirty="0" smtClean="0"/>
-              <a:t>UART Interrupt handler (acknowledging the commands)</a:t>
-            </a:r>
-            <a:endParaRPr lang="en-US" dirty="0"/>
-          </a:p>
-        </p:txBody>
-      </p:sp>
-      <p:pic>
-        <p:nvPicPr>
-          <p:cNvPr id="4" name="Content Placeholder 3"/>
-          <p:cNvPicPr>
-            <a:picLocks noGrp="1" noChangeAspect="1"/>
-          </p:cNvPicPr>
+              <a:t>Supported MCU Commands</a:t>
+            </a:r>
+            <a:endParaRPr lang="en-US" dirty="0"/>
+          </a:p>
+        </p:txBody>
+      </p:sp>
+      <p:sp>
+        <p:nvSpPr>
+          <p:cNvPr id="3" name="Content Placeholder 2"/>
+          <p:cNvSpPr>
+            <a:spLocks noGrp="1"/>
+          </p:cNvSpPr>
           <p:nvPr>
             <p:ph idx="1"/>
           </p:nvPr>
-        </p:nvPicPr>
-        <p:blipFill>
-          <a:blip r:embed="rId2"/>
-          <a:stretch>
-            <a:fillRect/>
-          </a:stretch>
-        </p:blipFill>
-        <p:spPr>
-          <a:xfrm>
-            <a:off x="2904547" y="2016124"/>
-            <a:ext cx="6697338" cy="4841876"/>
-          </a:xfrm>
-          <a:prstGeom prst="rect">
-            <a:avLst/>
-          </a:prstGeom>
-        </p:spPr>
-      </p:pic>
+        </p:nvSpPr>
+        <p:spPr/>
+        <p:txBody>
+          <a:bodyPr/>
+          <a:lstStyle/>
+          <a:p>
+            <a:r>
+              <a:rPr lang="en-US" dirty="0" smtClean="0"/>
+              <a:t>“a”</a:t>
+            </a:r>
+          </a:p>
+          <a:p>
+            <a:pPr lvl="1"/>
+            <a:r>
+              <a:rPr lang="en-US" dirty="0" smtClean="0"/>
+              <a:t>Returns an integer representing the heart rate (after three seconds)</a:t>
+            </a:r>
+          </a:p>
+          <a:p>
+            <a:r>
+              <a:rPr lang="en-US" dirty="0" smtClean="0"/>
+              <a:t>“b”</a:t>
+            </a:r>
+          </a:p>
+          <a:p>
+            <a:pPr lvl="1"/>
+            <a:r>
+              <a:rPr lang="en-US" dirty="0" smtClean="0"/>
+              <a:t>Immediately starts returning ADC readings at the specified sampling rate for 60 seconds</a:t>
+            </a:r>
+          </a:p>
+          <a:p>
+            <a:r>
+              <a:rPr lang="en-US" dirty="0" smtClean="0"/>
+              <a:t>“c&lt;rate&gt;c” (example:  “c50c”)</a:t>
+            </a:r>
+          </a:p>
+          <a:p>
+            <a:pPr lvl="1"/>
+            <a:r>
+              <a:rPr lang="en-US" dirty="0" smtClean="0"/>
+              <a:t>Sets the ADC sampling rate to “rate” (in the example it becomes 50)</a:t>
+            </a:r>
+            <a:endParaRPr lang="en-US" dirty="0"/>
+          </a:p>
+        </p:txBody>
+      </p:sp>
     </p:spTree>
     <p:extLst>
       <p:ext uri="{BB962C8B-B14F-4D97-AF65-F5344CB8AC3E}">
-        <p14:creationId xmlns:p14="http://schemas.microsoft.com/office/powerpoint/2010/main" val="716764989"/>
+        <p14:creationId xmlns:p14="http://schemas.microsoft.com/office/powerpoint/2010/main" val="3212976985"/>
       </p:ext>
     </p:extLst>
   </p:cSld>
@@ -5678,87 +5669,42 @@
           <a:p>
             <a:r>
               <a:rPr lang="en-US" dirty="0" smtClean="0"/>
-              <a:t>Setting sampling rate</a:t>
-            </a:r>
-            <a:endParaRPr lang="en-US" dirty="0"/>
-          </a:p>
-        </p:txBody>
-      </p:sp>
-      <p:sp>
-        <p:nvSpPr>
-          <p:cNvPr id="3" name="Content Placeholder 2"/>
-          <p:cNvSpPr>
-            <a:spLocks noGrp="1"/>
-          </p:cNvSpPr>
+              <a:t>UART Interrupt handler (acknowledging the commands)</a:t>
+            </a:r>
+            <a:endParaRPr lang="en-US" dirty="0"/>
+          </a:p>
+        </p:txBody>
+      </p:sp>
+      <p:pic>
+        <p:nvPicPr>
+          <p:cNvPr id="4" name="Content Placeholder 3"/>
+          <p:cNvPicPr>
+            <a:picLocks noGrp="1" noChangeAspect="1"/>
+          </p:cNvPicPr>
           <p:nvPr>
             <p:ph idx="1"/>
           </p:nvPr>
-        </p:nvSpPr>
-        <p:spPr/>
-        <p:txBody>
-          <a:bodyPr/>
-          <a:lstStyle/>
-          <a:p>
-            <a:r>
-              <a:rPr lang="en-US" dirty="0" smtClean="0"/>
-              <a:t>Serial command example: “c50c”</a:t>
-            </a:r>
-          </a:p>
-          <a:p>
-            <a:r>
-              <a:rPr lang="en-US" dirty="0" smtClean="0"/>
-              <a:t>Modifies Timer 1 in the microcontroller</a:t>
-            </a:r>
-          </a:p>
-          <a:p>
-            <a:pPr lvl="1"/>
-            <a:r>
-              <a:rPr lang="en-US" dirty="0" smtClean="0"/>
-              <a:t>Timer 1 has a fixed counter period of 500 and clock frequency of 8 MHz</a:t>
-            </a:r>
-          </a:p>
-          <a:p>
-            <a:pPr lvl="1"/>
-            <a:r>
-              <a:rPr lang="en-US" dirty="0" smtClean="0"/>
-              <a:t>Timer 1 pre-scaler is modified with the sampling rate</a:t>
-            </a:r>
-          </a:p>
-          <a:p>
-            <a:pPr lvl="2"/>
-            <a:r>
-              <a:rPr lang="en-US" dirty="0" smtClean="0"/>
-              <a:t>Pre-scaler = 16000 / sampling rate</a:t>
-            </a:r>
-          </a:p>
-          <a:p>
-            <a:pPr lvl="2"/>
-            <a:r>
-              <a:rPr lang="en-US" dirty="0" smtClean="0"/>
-              <a:t>Overflow frequency = 8000000 / ( 500 * 16000 / sampling rate ) = sampling rate</a:t>
-            </a:r>
-            <a:endParaRPr lang="en-US" dirty="0"/>
-          </a:p>
-          <a:p>
-            <a:pPr lvl="1"/>
-            <a:r>
-              <a:rPr lang="en-US" dirty="0" smtClean="0"/>
-              <a:t>Overflow interrupt handler is called with the same frequency as the specified sampling rate</a:t>
-            </a:r>
-          </a:p>
-          <a:p>
-            <a:pPr lvl="2"/>
-            <a:r>
-              <a:rPr lang="en-US" dirty="0" smtClean="0"/>
-              <a:t>The handler initiates ADC conversion of the input ECG signal</a:t>
-            </a:r>
-          </a:p>
-        </p:txBody>
-      </p:sp>
+        </p:nvPicPr>
+        <p:blipFill>
+          <a:blip r:embed="rId2"/>
+          <a:stretch>
+            <a:fillRect/>
+          </a:stretch>
+        </p:blipFill>
+        <p:spPr>
+          <a:xfrm>
+            <a:off x="2904547" y="2016124"/>
+            <a:ext cx="6697338" cy="4841876"/>
+          </a:xfrm>
+          <a:prstGeom prst="rect">
+            <a:avLst/>
+          </a:prstGeom>
+        </p:spPr>
+      </p:pic>
     </p:spTree>
     <p:extLst>
       <p:ext uri="{BB962C8B-B14F-4D97-AF65-F5344CB8AC3E}">
-        <p14:creationId xmlns:p14="http://schemas.microsoft.com/office/powerpoint/2010/main" val="2443753236"/>
+        <p14:creationId xmlns:p14="http://schemas.microsoft.com/office/powerpoint/2010/main" val="716764989"/>
       </p:ext>
     </p:extLst>
   </p:cSld>

</xml_diff>

<commit_message>
Updating report and ppt
</commit_message>
<xml_diff>
--- a/ECG Heart Monitor.pptx
+++ b/ECG Heart Monitor.pptx
@@ -269,7 +269,7 @@
           <a:p>
             <a:fld id="{48A87A34-81AB-432B-8DAE-1953F412C126}" type="datetimeFigureOut">
               <a:rPr lang="en-US" dirty="0"/>
-              <a:t>19-May-20</a:t>
+              <a:t>25-May-20</a:t>
             </a:fld>
             <a:endParaRPr lang="en-US" dirty="0"/>
           </a:p>
@@ -475,7 +475,7 @@
           <a:p>
             <a:fld id="{48A87A34-81AB-432B-8DAE-1953F412C126}" type="datetimeFigureOut">
               <a:rPr lang="en-US" dirty="0"/>
-              <a:t>19-May-20</a:t>
+              <a:t>25-May-20</a:t>
             </a:fld>
             <a:endParaRPr lang="en-US" dirty="0"/>
           </a:p>
@@ -685,7 +685,7 @@
           <a:p>
             <a:fld id="{48A87A34-81AB-432B-8DAE-1953F412C126}" type="datetimeFigureOut">
               <a:rPr lang="en-US" dirty="0"/>
-              <a:t>19-May-20</a:t>
+              <a:t>25-May-20</a:t>
             </a:fld>
             <a:endParaRPr lang="en-US" dirty="0"/>
           </a:p>
@@ -881,7 +881,7 @@
           <a:p>
             <a:fld id="{48A87A34-81AB-432B-8DAE-1953F412C126}" type="datetimeFigureOut">
               <a:rPr lang="en-US" dirty="0"/>
-              <a:t>19-May-20</a:t>
+              <a:t>25-May-20</a:t>
             </a:fld>
             <a:endParaRPr lang="en-US" dirty="0"/>
           </a:p>
@@ -1155,7 +1155,7 @@
           <a:p>
             <a:fld id="{48A87A34-81AB-432B-8DAE-1953F412C126}" type="datetimeFigureOut">
               <a:rPr lang="en-US" dirty="0"/>
-              <a:t>19-May-20</a:t>
+              <a:t>25-May-20</a:t>
             </a:fld>
             <a:endParaRPr lang="en-US" dirty="0"/>
           </a:p>
@@ -1418,7 +1418,7 @@
           <a:p>
             <a:fld id="{48A87A34-81AB-432B-8DAE-1953F412C126}" type="datetimeFigureOut">
               <a:rPr lang="en-US" dirty="0"/>
-              <a:t>19-May-20</a:t>
+              <a:t>25-May-20</a:t>
             </a:fld>
             <a:endParaRPr lang="en-US" dirty="0"/>
           </a:p>
@@ -1829,7 +1829,7 @@
           <a:p>
             <a:fld id="{48A87A34-81AB-432B-8DAE-1953F412C126}" type="datetimeFigureOut">
               <a:rPr lang="en-US" dirty="0"/>
-              <a:t>19-May-20</a:t>
+              <a:t>25-May-20</a:t>
             </a:fld>
             <a:endParaRPr lang="en-US" dirty="0"/>
           </a:p>
@@ -1973,7 +1973,7 @@
           <a:p>
             <a:fld id="{48A87A34-81AB-432B-8DAE-1953F412C126}" type="datetimeFigureOut">
               <a:rPr lang="en-US" dirty="0"/>
-              <a:t>19-May-20</a:t>
+              <a:t>25-May-20</a:t>
             </a:fld>
             <a:endParaRPr lang="en-US" dirty="0"/>
           </a:p>
@@ -2094,7 +2094,7 @@
           <a:p>
             <a:fld id="{48A87A34-81AB-432B-8DAE-1953F412C126}" type="datetimeFigureOut">
               <a:rPr lang="en-US" dirty="0"/>
-              <a:t>19-May-20</a:t>
+              <a:t>25-May-20</a:t>
             </a:fld>
             <a:endParaRPr lang="en-US" dirty="0"/>
           </a:p>
@@ -2340,7 +2340,7 @@
           <a:p>
             <a:fld id="{48A87A34-81AB-432B-8DAE-1953F412C126}" type="datetimeFigureOut">
               <a:rPr lang="en-US" dirty="0"/>
-              <a:t>19-May-20</a:t>
+              <a:t>25-May-20</a:t>
             </a:fld>
             <a:endParaRPr lang="en-US" dirty="0"/>
           </a:p>
@@ -2781,7 +2781,7 @@
             <a:fld id="{48A87A34-81AB-432B-8DAE-1953F412C126}" type="datetimeFigureOut">
               <a:rPr lang="en-US" dirty="0"/>
               <a:pPr/>
-              <a:t>19-May-20</a:t>
+              <a:t>25-May-20</a:t>
             </a:fld>
             <a:endParaRPr lang="en-US" dirty="0"/>
           </a:p>
@@ -3103,7 +3103,7 @@
             <a:fld id="{48A87A34-81AB-432B-8DAE-1953F412C126}" type="datetimeFigureOut">
               <a:rPr lang="en-US" dirty="0"/>
               <a:pPr/>
-              <a:t>19-May-20</a:t>
+              <a:t>25-May-20</a:t>
             </a:fld>
             <a:endParaRPr lang="en-US" dirty="0"/>
           </a:p>
@@ -4062,7 +4062,15 @@
             </a:r>
             <a:r>
               <a:rPr lang="en-US" dirty="0" smtClean="0"/>
-              <a:t> to collect ADC data for 3 seconds</a:t>
+              <a:t> to collect ADC data for </a:t>
+            </a:r>
+            <a:r>
+              <a:rPr lang="en-US" dirty="0" smtClean="0"/>
+              <a:t>3 </a:t>
+            </a:r>
+            <a:r>
+              <a:rPr lang="en-US" dirty="0" smtClean="0"/>
+              <a:t>seconds</a:t>
             </a:r>
           </a:p>
           <a:p>
@@ -4088,7 +4096,11 @@
             <a:pPr lvl="1"/>
             <a:r>
               <a:rPr lang="en-US" dirty="0" smtClean="0"/>
-              <a:t>300 data points are collected</a:t>
+              <a:t>200 </a:t>
+            </a:r>
+            <a:r>
+              <a:rPr lang="en-US" dirty="0" smtClean="0"/>
+              <a:t>data points are collected</a:t>
             </a:r>
           </a:p>
           <a:p>
@@ -4177,39 +4189,34 @@
           <a:p>
             <a:r>
               <a:rPr lang="en-US" dirty="0" smtClean="0"/>
-              <a:t>The first peak is identified in the 3 seconds window</a:t>
+              <a:t>The first peak is identified in the </a:t>
+            </a:r>
+            <a:r>
+              <a:rPr lang="en-US" dirty="0" smtClean="0"/>
+              <a:t>2 </a:t>
+            </a:r>
+            <a:r>
+              <a:rPr lang="en-US" dirty="0" smtClean="0"/>
+              <a:t>seconds window</a:t>
             </a:r>
           </a:p>
           <a:p>
             <a:pPr lvl="1"/>
             <a:r>
               <a:rPr lang="en-US" dirty="0" smtClean="0"/>
-              <a:t>A peak is defined as a data point with a larger value than the </a:t>
-            </a:r>
-            <a:r>
-              <a:rPr lang="en-US" dirty="0" smtClean="0"/>
-              <a:t>60 surrounding points</a:t>
-            </a:r>
-            <a:endParaRPr lang="en-US" dirty="0" smtClean="0"/>
-          </a:p>
-          <a:p>
-            <a:r>
-              <a:rPr lang="en-US" dirty="0" smtClean="0"/>
-              <a:t>The next peak is </a:t>
-            </a:r>
-            <a:r>
-              <a:rPr lang="en-US" dirty="0" smtClean="0"/>
-              <a:t>identified in the same way</a:t>
-            </a:r>
-          </a:p>
-          <a:p>
-            <a:r>
-              <a:rPr lang="en-US" dirty="0" smtClean="0"/>
-              <a:t>The </a:t>
-            </a:r>
-            <a:r>
-              <a:rPr lang="en-US" dirty="0" smtClean="0"/>
-              <a:t>period of the heart rate is the time difference of the two peaks</a:t>
+              <a:t>A peak is defined as a data point with a larger value than the 60 surrounding points</a:t>
+            </a:r>
+          </a:p>
+          <a:p>
+            <a:r>
+              <a:rPr lang="en-US" dirty="0" smtClean="0"/>
+              <a:t>The next peak is identified in the same way</a:t>
+            </a:r>
+          </a:p>
+          <a:p>
+            <a:r>
+              <a:rPr lang="en-US" dirty="0" smtClean="0"/>
+              <a:t>The period of the heart rate is the time difference of the two peaks</a:t>
             </a:r>
           </a:p>
           <a:p>
@@ -4939,7 +4946,19 @@
           <a:p>
             <a:r>
               <a:rPr lang="en-US" dirty="0" smtClean="0"/>
-              <a:t>Electrocardiograms (ECGs) are analog sensors that produce an analog electrical signal corresponding to electric signals generated through a patient’s heartbeat.</a:t>
+              <a:t>Electrocardiogram </a:t>
+            </a:r>
+            <a:r>
+              <a:rPr lang="en-US" dirty="0" smtClean="0"/>
+              <a:t>(</a:t>
+            </a:r>
+            <a:r>
+              <a:rPr lang="en-US" dirty="0" smtClean="0"/>
+              <a:t>ECG) monitors </a:t>
+            </a:r>
+            <a:r>
+              <a:rPr lang="en-US" dirty="0" smtClean="0"/>
+              <a:t>are analog sensors that produce an analog electrical signal corresponding to electric signals generated through a patient’s heartbeat.</a:t>
             </a:r>
           </a:p>
           <a:p>

</xml_diff>